<commit_message>
Update design poster 2
</commit_message>
<xml_diff>
--- a/PDS-INFO-2-G5.pptx
+++ b/PDS-INFO-2-G5.pptx
@@ -4368,84 +4368,12 @@
           <a:chExt cx="0" cy="0"/>
         </a:xfrm>
       </p:grpSpPr>
-      <p:pic>
-        <p:nvPicPr>
-          <p:cNvPr id="8" name="Picture 7" descr="A screenshot of a cell phone&#10;&#10;Description automatically generated">
+      <p:sp>
+        <p:nvSpPr>
+          <p:cNvPr id="38" name="Rectangle: Rounded Corners 37">
             <a:extLst>
               <a:ext uri="{FF2B5EF4-FFF2-40B4-BE49-F238E27FC236}">
-                <a16:creationId xmlns:a16="http://schemas.microsoft.com/office/drawing/2014/main" id="{A14AD4C3-93BF-432E-9860-A92EFC207D59}"/>
-              </a:ext>
-            </a:extLst>
-          </p:cNvPr>
-          <p:cNvPicPr>
-            <a:picLocks noChangeAspect="1"/>
-          </p:cNvPicPr>
-          <p:nvPr/>
-        </p:nvPicPr>
-        <p:blipFill>
-          <a:blip r:embed="rId3">
-            <a:extLst>
-              <a:ext uri="{28A0092B-C50C-407E-A947-70E740481C1C}">
-                <a14:useLocalDpi xmlns:a14="http://schemas.microsoft.com/office/drawing/2010/main" val="0"/>
-              </a:ext>
-            </a:extLst>
-          </a:blip>
-          <a:stretch>
-            <a:fillRect/>
-          </a:stretch>
-        </p:blipFill>
-        <p:spPr>
-          <a:xfrm>
-            <a:off x="19819186" y="30228417"/>
-            <a:ext cx="9825033" cy="6818573"/>
-          </a:xfrm>
-          <a:prstGeom prst="rect">
-            <a:avLst/>
-          </a:prstGeom>
-        </p:spPr>
-      </p:pic>
-      <p:pic>
-        <p:nvPicPr>
-          <p:cNvPr id="5" name="Picture 4" descr="A picture containing map, text&#10;&#10;Description automatically generated">
-            <a:extLst>
-              <a:ext uri="{FF2B5EF4-FFF2-40B4-BE49-F238E27FC236}">
-                <a16:creationId xmlns:a16="http://schemas.microsoft.com/office/drawing/2014/main" id="{62400BA3-48D7-4269-9F0D-EC4FD71B23C6}"/>
-              </a:ext>
-            </a:extLst>
-          </p:cNvPr>
-          <p:cNvPicPr>
-            <a:picLocks noChangeAspect="1"/>
-          </p:cNvPicPr>
-          <p:nvPr/>
-        </p:nvPicPr>
-        <p:blipFill>
-          <a:blip r:embed="rId4">
-            <a:extLst>
-              <a:ext uri="{28A0092B-C50C-407E-A947-70E740481C1C}">
-                <a14:useLocalDpi xmlns:a14="http://schemas.microsoft.com/office/drawing/2010/main" val="0"/>
-              </a:ext>
-            </a:extLst>
-          </a:blip>
-          <a:stretch>
-            <a:fillRect/>
-          </a:stretch>
-        </p:blipFill>
-        <p:spPr>
-          <a:xfrm>
-            <a:off x="18166610" y="13798134"/>
-            <a:ext cx="13185693" cy="4454768"/>
-          </a:xfrm>
-          <a:prstGeom prst="rect">
-            <a:avLst/>
-          </a:prstGeom>
-        </p:spPr>
-      </p:pic>
-      <p:sp>
-        <p:nvSpPr>
-          <p:cNvPr id="6" name="Rectangle: Rounded Corners 5">
-            <a:extLst>
-              <a:ext uri="{FF2B5EF4-FFF2-40B4-BE49-F238E27FC236}">
-                <a16:creationId xmlns:a16="http://schemas.microsoft.com/office/drawing/2014/main" id="{16C412BC-7FD0-4FD7-A441-E859367890FD}"/>
+                <a16:creationId xmlns:a16="http://schemas.microsoft.com/office/drawing/2014/main" id="{F1E4ACFB-898C-4761-B849-BE2D67C2CED9}"/>
               </a:ext>
             </a:extLst>
           </p:cNvPr>
@@ -4454,13 +4382,17 @@
         </p:nvSpPr>
         <p:spPr bwMode="auto">
           <a:xfrm>
-            <a:off x="2033813" y="12996318"/>
-            <a:ext cx="14571364" cy="25571842"/>
+            <a:off x="17536184" y="12992101"/>
+            <a:ext cx="14571364" cy="27619324"/>
           </a:xfrm>
           <a:prstGeom prst="roundRect">
             <a:avLst/>
           </a:prstGeom>
-          <a:noFill/>
+          <a:solidFill>
+            <a:srgbClr val="CECEEF">
+              <a:alpha val="50196"/>
+            </a:srgbClr>
+          </a:solidFill>
           <a:ln w="9525" cap="flat" cmpd="sng" algn="ctr">
             <a:solidFill>
               <a:srgbClr val="6C5098"/>
@@ -4510,6 +4442,80 @@
           </a:p>
         </p:txBody>
       </p:sp>
+      <p:sp>
+        <p:nvSpPr>
+          <p:cNvPr id="6" name="Rectangle: Rounded Corners 5">
+            <a:extLst>
+              <a:ext uri="{FF2B5EF4-FFF2-40B4-BE49-F238E27FC236}">
+                <a16:creationId xmlns:a16="http://schemas.microsoft.com/office/drawing/2014/main" id="{16C412BC-7FD0-4FD7-A441-E859367890FD}"/>
+              </a:ext>
+            </a:extLst>
+          </p:cNvPr>
+          <p:cNvSpPr/>
+          <p:nvPr/>
+        </p:nvSpPr>
+        <p:spPr bwMode="auto">
+          <a:xfrm>
+            <a:off x="2033813" y="12996318"/>
+            <a:ext cx="14571364" cy="25332092"/>
+          </a:xfrm>
+          <a:prstGeom prst="roundRect">
+            <a:avLst/>
+          </a:prstGeom>
+          <a:solidFill>
+            <a:srgbClr val="CECEEF">
+              <a:alpha val="50196"/>
+            </a:srgbClr>
+          </a:solidFill>
+          <a:ln w="9525" cap="flat" cmpd="sng" algn="ctr">
+            <a:solidFill>
+              <a:srgbClr val="6C5098"/>
+            </a:solidFill>
+            <a:prstDash val="solid"/>
+            <a:round/>
+            <a:headEnd type="none" w="med" len="med"/>
+            <a:tailEnd type="none" w="med" len="med"/>
+          </a:ln>
+          <a:effectLst/>
+        </p:spPr>
+        <p:txBody>
+          <a:bodyPr vert="horz" wrap="square" lIns="91440" tIns="45720" rIns="91440" bIns="45720" numCol="1" rtlCol="0" anchor="t" anchorCtr="0" compatLnSpc="1">
+            <a:prstTxWarp prst="textNoShape">
+              <a:avLst/>
+            </a:prstTxWarp>
+          </a:bodyPr>
+          <a:lstStyle/>
+          <a:p>
+            <a:pPr marL="0" marR="0" indent="0" algn="l" defTabSz="914400" rtl="0" eaLnBrk="0" fontAlgn="base" latinLnBrk="0" hangingPunct="0">
+              <a:lnSpc>
+                <a:spcPct val="100000"/>
+              </a:lnSpc>
+              <a:spcBef>
+                <a:spcPct val="0"/>
+              </a:spcBef>
+              <a:spcAft>
+                <a:spcPct val="0"/>
+              </a:spcAft>
+              <a:buClrTx/>
+              <a:buSzTx/>
+              <a:buFontTx/>
+              <a:buNone/>
+              <a:tabLst/>
+            </a:pPr>
+            <a:endParaRPr kumimoji="0" lang="en-GB" sz="2400" b="0" i="0" u="none" strike="noStrike" cap="none" normalizeH="0" baseline="0" dirty="0">
+              <a:ln>
+                <a:noFill/>
+              </a:ln>
+              <a:solidFill>
+                <a:schemeClr val="tx1"/>
+              </a:solidFill>
+              <a:effectLst/>
+              <a:latin typeface="Arial" charset="0"/>
+              <a:ea typeface="ＭＳ Ｐゴシック" pitchFamily="1" charset="-128"/>
+            </a:endParaRPr>
+          </a:p>
+        </p:txBody>
+      </p:sp>
       <p:pic>
         <p:nvPicPr>
           <p:cNvPr id="14" name="Image 11" descr="Une image contenant texte, batterie&#10;&#10;Description générée avec un niveau de confiance élevé">
@@ -4525,7 +4531,7 @@
           <p:nvPr/>
         </p:nvPicPr>
         <p:blipFill>
-          <a:blip r:embed="rId5" cstate="print">
+          <a:blip r:embed="rId3" cstate="print">
             <a:extLst>
               <a:ext uri="{28A0092B-C50C-407E-A947-70E740481C1C}">
                 <a14:useLocalDpi xmlns:a14="http://schemas.microsoft.com/office/drawing/2010/main" val="0"/>
@@ -4555,7 +4561,7 @@
           <p:nvPr/>
         </p:nvPicPr>
         <p:blipFill>
-          <a:blip r:embed="rId6">
+          <a:blip r:embed="rId4">
             <a:extLst>
               <a:ext uri="{28A0092B-C50C-407E-A947-70E740481C1C}">
                 <a14:useLocalDpi xmlns:a14="http://schemas.microsoft.com/office/drawing/2010/main" val="0"/>
@@ -4947,7 +4953,7 @@
           <p:nvPr/>
         </p:nvPicPr>
         <p:blipFill>
-          <a:blip r:embed="rId7" cstate="print">
+          <a:blip r:embed="rId5" cstate="print">
             <a:extLst>
               <a:ext uri="{28A0092B-C50C-407E-A947-70E740481C1C}">
                 <a14:useLocalDpi xmlns:a14="http://schemas.microsoft.com/office/drawing/2010/main" val="0"/>
@@ -5001,7 +5007,7 @@
           <p:nvPr/>
         </p:nvPicPr>
         <p:blipFill>
-          <a:blip r:embed="rId8" cstate="print">
+          <a:blip r:embed="rId6" cstate="print">
             <a:extLst>
               <a:ext uri="{28A0092B-C50C-407E-A947-70E740481C1C}">
                 <a14:useLocalDpi xmlns:a14="http://schemas.microsoft.com/office/drawing/2010/main" val="0"/>
@@ -5258,7 +5264,7 @@
           <p:nvPr/>
         </p:nvPicPr>
         <p:blipFill>
-          <a:blip r:embed="rId9" cstate="print">
+          <a:blip r:embed="rId7" cstate="print">
             <a:extLst>
               <a:ext uri="{28A0092B-C50C-407E-A947-70E740481C1C}">
                 <a14:useLocalDpi xmlns:a14="http://schemas.microsoft.com/office/drawing/2010/main" val="0"/>
@@ -5318,7 +5324,7 @@
           <p:nvPr/>
         </p:nvPicPr>
         <p:blipFill>
-          <a:blip r:embed="rId10">
+          <a:blip r:embed="rId8">
             <a:extLst>
               <a:ext uri="{28A0092B-C50C-407E-A947-70E740481C1C}">
                 <a14:useLocalDpi xmlns:a14="http://schemas.microsoft.com/office/drawing/2010/main" val="0"/>
@@ -5993,10 +5999,74 @@
       </p:sp>
       <p:sp>
         <p:nvSpPr>
-          <p:cNvPr id="38" name="Rectangle: Rounded Corners 37">
+          <p:cNvPr id="44" name="Rectangle 43">
             <a:extLst>
               <a:ext uri="{FF2B5EF4-FFF2-40B4-BE49-F238E27FC236}">
-                <a16:creationId xmlns:a16="http://schemas.microsoft.com/office/drawing/2014/main" id="{F1E4ACFB-898C-4761-B849-BE2D67C2CED9}"/>
+                <a16:creationId xmlns:a16="http://schemas.microsoft.com/office/drawing/2014/main" id="{C38E9321-141F-4B54-A736-E28BE7449C5D}"/>
+              </a:ext>
+            </a:extLst>
+          </p:cNvPr>
+          <p:cNvSpPr/>
+          <p:nvPr/>
+        </p:nvSpPr>
+        <p:spPr>
+          <a:xfrm>
+            <a:off x="8115478" y="13104447"/>
+            <a:ext cx="2408032" cy="1323439"/>
+          </a:xfrm>
+          <a:prstGeom prst="rect">
+            <a:avLst/>
+          </a:prstGeom>
+          <a:noFill/>
+        </p:spPr>
+        <p:txBody>
+          <a:bodyPr wrap="none" lIns="91440" tIns="45720" rIns="91440" bIns="45720">
+            <a:spAutoFit/>
+          </a:bodyPr>
+          <a:lstStyle/>
+          <a:p>
+            <a:pPr algn="ctr"/>
+            <a:r>
+              <a:rPr lang="en-US" sz="8000" b="1" dirty="0">
+                <a:ln w="22225">
+                  <a:solidFill>
+                    <a:schemeClr val="accent2"/>
+                  </a:solidFill>
+                  <a:prstDash val="solid"/>
+                </a:ln>
+                <a:solidFill>
+                  <a:schemeClr val="accent2">
+                    <a:lumMod val="60000"/>
+                    <a:lumOff val="40000"/>
+                  </a:schemeClr>
+                </a:solidFill>
+              </a:rPr>
+              <a:t>SVM</a:t>
+            </a:r>
+            <a:endParaRPr lang="en-US" sz="8000" b="1" cap="none" spc="0" dirty="0">
+              <a:ln w="22225">
+                <a:solidFill>
+                  <a:schemeClr val="accent2"/>
+                </a:solidFill>
+                <a:prstDash val="solid"/>
+              </a:ln>
+              <a:solidFill>
+                <a:schemeClr val="accent2">
+                  <a:lumMod val="60000"/>
+                  <a:lumOff val="40000"/>
+                </a:schemeClr>
+              </a:solidFill>
+              <a:effectLst/>
+            </a:endParaRPr>
+          </a:p>
+        </p:txBody>
+      </p:sp>
+      <p:sp>
+        <p:nvSpPr>
+          <p:cNvPr id="47" name="Rectangle: Rounded Corners 46">
+            <a:extLst>
+              <a:ext uri="{FF2B5EF4-FFF2-40B4-BE49-F238E27FC236}">
+                <a16:creationId xmlns:a16="http://schemas.microsoft.com/office/drawing/2014/main" id="{9B404301-BCD4-4CF8-BDA2-CA4F6D43544B}"/>
               </a:ext>
             </a:extLst>
           </p:cNvPr>
@@ -6005,13 +6075,15 @@
         </p:nvSpPr>
         <p:spPr bwMode="auto">
           <a:xfrm>
-            <a:off x="17536184" y="12992101"/>
-            <a:ext cx="14571364" cy="27619324"/>
+            <a:off x="18166609" y="18648052"/>
+            <a:ext cx="13307903" cy="4933442"/>
           </a:xfrm>
           <a:prstGeom prst="roundRect">
             <a:avLst/>
           </a:prstGeom>
-          <a:noFill/>
+          <a:solidFill>
+            <a:schemeClr val="bg1"/>
+          </a:solidFill>
           <a:ln w="9525" cap="flat" cmpd="sng" algn="ctr">
             <a:solidFill>
               <a:srgbClr val="6C5098"/>
@@ -6063,1063 +6135,10 @@
       </p:sp>
       <p:sp>
         <p:nvSpPr>
-          <p:cNvPr id="44" name="Rectangle 43">
+          <p:cNvPr id="48" name="Rectangle: Rounded Corners 47">
             <a:extLst>
               <a:ext uri="{FF2B5EF4-FFF2-40B4-BE49-F238E27FC236}">
-                <a16:creationId xmlns:a16="http://schemas.microsoft.com/office/drawing/2014/main" id="{C38E9321-141F-4B54-A736-E28BE7449C5D}"/>
-              </a:ext>
-            </a:extLst>
-          </p:cNvPr>
-          <p:cNvSpPr/>
-          <p:nvPr/>
-        </p:nvSpPr>
-        <p:spPr>
-          <a:xfrm>
-            <a:off x="8115478" y="13104447"/>
-            <a:ext cx="2408032" cy="1323439"/>
-          </a:xfrm>
-          <a:prstGeom prst="rect">
-            <a:avLst/>
-          </a:prstGeom>
-          <a:noFill/>
-        </p:spPr>
-        <p:txBody>
-          <a:bodyPr wrap="none" lIns="91440" tIns="45720" rIns="91440" bIns="45720">
-            <a:spAutoFit/>
-          </a:bodyPr>
-          <a:lstStyle/>
-          <a:p>
-            <a:pPr algn="ctr"/>
-            <a:r>
-              <a:rPr lang="en-US" sz="8000" b="1" dirty="0">
-                <a:ln w="22225">
-                  <a:solidFill>
-                    <a:schemeClr val="accent2"/>
-                  </a:solidFill>
-                  <a:prstDash val="solid"/>
-                </a:ln>
-                <a:solidFill>
-                  <a:schemeClr val="accent2">
-                    <a:lumMod val="40000"/>
-                    <a:lumOff val="60000"/>
-                  </a:schemeClr>
-                </a:solidFill>
-              </a:rPr>
-              <a:t>SVM</a:t>
-            </a:r>
-            <a:endParaRPr lang="en-US" sz="8000" b="1" cap="none" spc="0" dirty="0">
-              <a:ln w="22225">
-                <a:solidFill>
-                  <a:schemeClr val="accent2"/>
-                </a:solidFill>
-                <a:prstDash val="solid"/>
-              </a:ln>
-              <a:solidFill>
-                <a:schemeClr val="accent2">
-                  <a:lumMod val="40000"/>
-                  <a:lumOff val="60000"/>
-                </a:schemeClr>
-              </a:solidFill>
-              <a:effectLst/>
-            </a:endParaRPr>
-          </a:p>
-        </p:txBody>
-      </p:sp>
-      <p:sp>
-        <p:nvSpPr>
-          <p:cNvPr id="45" name="TextBox 44">
-            <a:extLst>
-              <a:ext uri="{FF2B5EF4-FFF2-40B4-BE49-F238E27FC236}">
-                <a16:creationId xmlns:a16="http://schemas.microsoft.com/office/drawing/2014/main" id="{9EB1432B-3134-4FD4-97BE-54F5280D87B4}"/>
-              </a:ext>
-            </a:extLst>
-          </p:cNvPr>
-          <p:cNvSpPr txBox="1"/>
-          <p:nvPr/>
-        </p:nvSpPr>
-        <p:spPr>
-          <a:xfrm>
-            <a:off x="18527093" y="36686950"/>
-            <a:ext cx="12885860" cy="3600986"/>
-          </a:xfrm>
-          <a:prstGeom prst="rect">
-            <a:avLst/>
-          </a:prstGeom>
-          <a:noFill/>
-        </p:spPr>
-        <p:txBody>
-          <a:bodyPr wrap="square" rtlCol="0">
-            <a:spAutoFit/>
-          </a:bodyPr>
-          <a:lstStyle/>
-          <a:p>
-            <a:pPr algn="ctr"/>
-            <a:r>
-              <a:rPr lang="en-US" sz="3800" b="1" dirty="0">
-                <a:solidFill>
-                  <a:srgbClr val="6C5098"/>
-                </a:solidFill>
-              </a:rPr>
-              <a:t>Transfer learning</a:t>
-            </a:r>
-          </a:p>
-          <a:p>
-            <a:pPr algn="ctr"/>
-            <a:r>
-              <a:rPr lang="fr-FR" sz="3800" dirty="0"/>
-              <a:t>consiste à utiliser un modèle pré-entraîné pour un problème de classification et de l’adapter à un nouveau problème. Pour ce faire il faut prendre le modèle pré-entraîné en réentraînant ses dernières couches fully-connected sur le nouveau jeu de données.</a:t>
-            </a:r>
-          </a:p>
-        </p:txBody>
-      </p:sp>
-      <p:pic>
-        <p:nvPicPr>
-          <p:cNvPr id="51" name="Picture 50" descr="A picture containing drawing&#10;&#10;Description automatically generated">
-            <a:extLst>
-              <a:ext uri="{FF2B5EF4-FFF2-40B4-BE49-F238E27FC236}">
-                <a16:creationId xmlns:a16="http://schemas.microsoft.com/office/drawing/2014/main" id="{EB922F53-BD98-4841-A12F-C78AB8BC1675}"/>
-              </a:ext>
-            </a:extLst>
-          </p:cNvPr>
-          <p:cNvPicPr>
-            <a:picLocks noChangeAspect="1"/>
-          </p:cNvPicPr>
-          <p:nvPr/>
-        </p:nvPicPr>
-        <p:blipFill>
-          <a:blip r:embed="rId11">
-            <a:extLst>
-              <a:ext uri="{28A0092B-C50C-407E-A947-70E740481C1C}">
-                <a14:useLocalDpi xmlns:a14="http://schemas.microsoft.com/office/drawing/2010/main" val="0"/>
-              </a:ext>
-            </a:extLst>
-          </a:blip>
-          <a:stretch>
-            <a:fillRect/>
-          </a:stretch>
-        </p:blipFill>
-        <p:spPr>
-          <a:xfrm>
-            <a:off x="4692999" y="31646390"/>
-            <a:ext cx="9436027" cy="2763408"/>
-          </a:xfrm>
-          <a:prstGeom prst="rect">
-            <a:avLst/>
-          </a:prstGeom>
-        </p:spPr>
-      </p:pic>
-      <p:pic>
-        <p:nvPicPr>
-          <p:cNvPr id="53" name="Graphic 52">
-            <a:extLst>
-              <a:ext uri="{FF2B5EF4-FFF2-40B4-BE49-F238E27FC236}">
-                <a16:creationId xmlns:a16="http://schemas.microsoft.com/office/drawing/2014/main" id="{07831D89-DC11-46AC-AD70-A90F6820CF82}"/>
-              </a:ext>
-            </a:extLst>
-          </p:cNvPr>
-          <p:cNvPicPr>
-            <a:picLocks noChangeAspect="1"/>
-          </p:cNvPicPr>
-          <p:nvPr/>
-        </p:nvPicPr>
-        <p:blipFill>
-          <a:blip r:embed="rId12">
-            <a:extLst>
-              <a:ext uri="{28A0092B-C50C-407E-A947-70E740481C1C}">
-                <a14:useLocalDpi xmlns:a14="http://schemas.microsoft.com/office/drawing/2010/main" val="0"/>
-              </a:ext>
-              <a:ext uri="{96DAC541-7B7A-43D3-8B79-37D633B846F1}">
-                <asvg:svgBlip xmlns:asvg="http://schemas.microsoft.com/office/drawing/2016/SVG/main" r:embed="rId13"/>
-              </a:ext>
-            </a:extLst>
-          </a:blip>
-          <a:stretch>
-            <a:fillRect/>
-          </a:stretch>
-        </p:blipFill>
-        <p:spPr>
-          <a:xfrm>
-            <a:off x="9834449" y="26003082"/>
-            <a:ext cx="6039162" cy="1453274"/>
-          </a:xfrm>
-          <a:prstGeom prst="rect">
-            <a:avLst/>
-          </a:prstGeom>
-        </p:spPr>
-      </p:pic>
-      <p:sp>
-        <p:nvSpPr>
-          <p:cNvPr id="78" name="TextBox 77">
-            <a:extLst>
-              <a:ext uri="{FF2B5EF4-FFF2-40B4-BE49-F238E27FC236}">
-                <a16:creationId xmlns:a16="http://schemas.microsoft.com/office/drawing/2014/main" id="{D87A0A6C-6B54-437E-9926-C97DE0DC85E1}"/>
-              </a:ext>
-            </a:extLst>
-          </p:cNvPr>
-          <p:cNvSpPr txBox="1"/>
-          <p:nvPr/>
-        </p:nvSpPr>
-        <p:spPr>
-          <a:xfrm>
-            <a:off x="2757063" y="28190006"/>
-            <a:ext cx="13307903" cy="3016210"/>
-          </a:xfrm>
-          <a:prstGeom prst="rect">
-            <a:avLst/>
-          </a:prstGeom>
-          <a:noFill/>
-        </p:spPr>
-        <p:txBody>
-          <a:bodyPr wrap="square" rtlCol="0">
-            <a:spAutoFit/>
-          </a:bodyPr>
-          <a:lstStyle/>
-          <a:p>
-            <a:pPr algn="ctr"/>
-            <a:r>
-              <a:rPr lang="en-US" sz="3800" b="1" dirty="0">
-                <a:solidFill>
-                  <a:srgbClr val="6C5098"/>
-                </a:solidFill>
-              </a:rPr>
-              <a:t>Radial basis function (RBF)</a:t>
-            </a:r>
-            <a:endParaRPr lang="en-GB" sz="3800" b="1" dirty="0">
-              <a:solidFill>
-                <a:srgbClr val="6C5098"/>
-              </a:solidFill>
-            </a:endParaRPr>
-          </a:p>
-          <a:p>
-            <a:pPr algn="ctr"/>
-            <a:r>
-              <a:rPr lang="fr-FR" sz="3800" dirty="0"/>
-              <a:t>est une fonction noyau de transformation permettant de trouver l’hyperplan séparateur adéquat en calculant plus efficacement les produits scalaires des projections des données.</a:t>
-            </a:r>
-          </a:p>
-        </p:txBody>
-      </p:sp>
-      <p:sp>
-        <p:nvSpPr>
-          <p:cNvPr id="79" name="TextBox 78">
-            <a:extLst>
-              <a:ext uri="{FF2B5EF4-FFF2-40B4-BE49-F238E27FC236}">
-                <a16:creationId xmlns:a16="http://schemas.microsoft.com/office/drawing/2014/main" id="{1D36B01D-440B-454A-B4F7-9AE59D7116E8}"/>
-              </a:ext>
-            </a:extLst>
-          </p:cNvPr>
-          <p:cNvSpPr txBox="1"/>
-          <p:nvPr/>
-        </p:nvSpPr>
-        <p:spPr>
-          <a:xfrm>
-            <a:off x="2792935" y="34526710"/>
-            <a:ext cx="13307903" cy="3016210"/>
-          </a:xfrm>
-          <a:prstGeom prst="rect">
-            <a:avLst/>
-          </a:prstGeom>
-          <a:noFill/>
-        </p:spPr>
-        <p:txBody>
-          <a:bodyPr wrap="square" rtlCol="0">
-            <a:spAutoFit/>
-          </a:bodyPr>
-          <a:lstStyle/>
-          <a:p>
-            <a:pPr algn="ctr"/>
-            <a:r>
-              <a:rPr lang="fr-FR" sz="3800" b="1" dirty="0">
-                <a:solidFill>
-                  <a:srgbClr val="6C5098"/>
-                </a:solidFill>
-              </a:rPr>
-              <a:t>One vs One</a:t>
-            </a:r>
-          </a:p>
-          <a:p>
-            <a:pPr algn="ctr"/>
-            <a:r>
-              <a:rPr lang="fr-FR" sz="3800" dirty="0"/>
-              <a:t>K (K - 1) / 2 classificateurs binaires sont créés. Au moment de la prédiction, un système de vote est appliqué, la classe qui a obtenu le plus grand nombre de prédictions est prédite par le classificateur combiné.</a:t>
-            </a:r>
-          </a:p>
-        </p:txBody>
-      </p:sp>
-      <p:sp>
-        <p:nvSpPr>
-          <p:cNvPr id="12" name="Rectangle 11">
-            <a:extLst>
-              <a:ext uri="{FF2B5EF4-FFF2-40B4-BE49-F238E27FC236}">
-                <a16:creationId xmlns:a16="http://schemas.microsoft.com/office/drawing/2014/main" id="{29B13DE1-B03F-49D8-80FA-892FABC9A966}"/>
-              </a:ext>
-            </a:extLst>
-          </p:cNvPr>
-          <p:cNvSpPr/>
-          <p:nvPr/>
-        </p:nvSpPr>
-        <p:spPr>
-          <a:xfrm>
-            <a:off x="23617348" y="13104448"/>
-            <a:ext cx="2406428" cy="1323439"/>
-          </a:xfrm>
-          <a:prstGeom prst="rect">
-            <a:avLst/>
-          </a:prstGeom>
-          <a:noFill/>
-        </p:spPr>
-        <p:txBody>
-          <a:bodyPr wrap="none" lIns="91440" tIns="45720" rIns="91440" bIns="45720">
-            <a:spAutoFit/>
-          </a:bodyPr>
-          <a:lstStyle/>
-          <a:p>
-            <a:pPr algn="ctr"/>
-            <a:r>
-              <a:rPr lang="en-US" sz="8000" b="1" dirty="0">
-                <a:ln w="22225">
-                  <a:solidFill>
-                    <a:schemeClr val="accent2"/>
-                  </a:solidFill>
-                  <a:prstDash val="solid"/>
-                </a:ln>
-                <a:solidFill>
-                  <a:schemeClr val="accent2">
-                    <a:lumMod val="40000"/>
-                    <a:lumOff val="60000"/>
-                  </a:schemeClr>
-                </a:solidFill>
-              </a:rPr>
-              <a:t>CNN</a:t>
-            </a:r>
-            <a:endParaRPr lang="en-US" sz="8000" b="1" cap="none" spc="0" dirty="0">
-              <a:ln w="22225">
-                <a:solidFill>
-                  <a:schemeClr val="accent2"/>
-                </a:solidFill>
-                <a:prstDash val="solid"/>
-              </a:ln>
-              <a:solidFill>
-                <a:schemeClr val="accent2">
-                  <a:lumMod val="40000"/>
-                  <a:lumOff val="60000"/>
-                </a:schemeClr>
-              </a:solidFill>
-              <a:effectLst/>
-            </a:endParaRPr>
-          </a:p>
-        </p:txBody>
-      </p:sp>
-      <p:graphicFrame>
-        <p:nvGraphicFramePr>
-          <p:cNvPr id="11" name="Table 18">
-            <a:extLst>
-              <a:ext uri="{FF2B5EF4-FFF2-40B4-BE49-F238E27FC236}">
-                <a16:creationId xmlns:a16="http://schemas.microsoft.com/office/drawing/2014/main" id="{BCBAF032-1143-44B8-8A28-B9DB00CA3586}"/>
-              </a:ext>
-            </a:extLst>
-          </p:cNvPr>
-          <p:cNvGraphicFramePr>
-            <a:graphicFrameLocks noGrp="1"/>
-          </p:cNvGraphicFramePr>
-          <p:nvPr>
-            <p:extLst>
-              <p:ext uri="{D42A27DB-BD31-4B8C-83A1-F6EECF244321}">
-                <p14:modId xmlns:p14="http://schemas.microsoft.com/office/powerpoint/2010/main" val="2662529017"/>
-              </p:ext>
-            </p:extLst>
-          </p:nvPr>
-        </p:nvGraphicFramePr>
-        <p:xfrm>
-          <a:off x="18112011" y="18843094"/>
-          <a:ext cx="13362502" cy="4568264"/>
-        </p:xfrm>
-        <a:graphic>
-          <a:graphicData uri="http://schemas.openxmlformats.org/drawingml/2006/table">
-            <a:tbl>
-              <a:tblPr firstRow="1" bandRow="1">
-                <a:tableStyleId>{5C22544A-7EE6-4342-B048-85BDC9FD1C3A}</a:tableStyleId>
-              </a:tblPr>
-              <a:tblGrid>
-                <a:gridCol w="6681251">
-                  <a:extLst>
-                    <a:ext uri="{9D8B030D-6E8A-4147-A177-3AD203B41FA5}">
-                      <a16:colId xmlns:a16="http://schemas.microsoft.com/office/drawing/2014/main" val="1643344713"/>
-                    </a:ext>
-                  </a:extLst>
-                </a:gridCol>
-                <a:gridCol w="6681251">
-                  <a:extLst>
-                    <a:ext uri="{9D8B030D-6E8A-4147-A177-3AD203B41FA5}">
-                      <a16:colId xmlns:a16="http://schemas.microsoft.com/office/drawing/2014/main" val="2838925563"/>
-                    </a:ext>
-                  </a:extLst>
-                </a:gridCol>
-              </a:tblGrid>
-              <a:tr h="1306904">
-                <a:tc gridSpan="2">
-                  <a:txBody>
-                    <a:bodyPr/>
-                    <a:lstStyle/>
-                    <a:p>
-                      <a:pPr algn="ctr"/>
-                      <a:r>
-                        <a:rPr lang="fr-FR" sz="3800" noProof="0" dirty="0">
-                          <a:solidFill>
-                            <a:srgbClr val="6C5098"/>
-                          </a:solidFill>
-                        </a:rPr>
-                        <a:t>Bloc Filtreur</a:t>
-                      </a:r>
-                    </a:p>
-                    <a:p>
-                      <a:pPr algn="ctr"/>
-                      <a:r>
-                        <a:rPr lang="fr-FR" sz="3800" b="0" dirty="0">
-                          <a:solidFill>
-                            <a:schemeClr val="tx1"/>
-                          </a:solidFill>
-                        </a:rPr>
-                        <a:t>extrait les caractéristiques des images.</a:t>
-                      </a:r>
-                    </a:p>
-                  </a:txBody>
-                  <a:tcPr>
-                    <a:noFill/>
-                  </a:tcPr>
-                </a:tc>
-                <a:tc hMerge="1">
-                  <a:txBody>
-                    <a:bodyPr/>
-                    <a:lstStyle/>
-                    <a:p>
-                      <a:endParaRPr lang="en-GB" dirty="0"/>
-                    </a:p>
-                  </a:txBody>
-                  <a:tcPr/>
-                </a:tc>
-                <a:extLst>
-                  <a:ext uri="{0D108BD9-81ED-4DB2-BD59-A6C34878D82A}">
-                    <a16:rowId xmlns:a16="http://schemas.microsoft.com/office/drawing/2014/main" val="1993528755"/>
-                  </a:ext>
-                </a:extLst>
-              </a:tr>
-              <a:tr h="3147864">
-                <a:tc>
-                  <a:txBody>
-                    <a:bodyPr/>
-                    <a:lstStyle/>
-                    <a:p>
-                      <a:pPr marL="0" marR="0" lvl="0" indent="0" algn="ctr" defTabSz="914400" rtl="0" eaLnBrk="0" fontAlgn="base" latinLnBrk="0" hangingPunct="0">
-                        <a:lnSpc>
-                          <a:spcPct val="100000"/>
-                        </a:lnSpc>
-                        <a:spcBef>
-                          <a:spcPct val="0"/>
-                        </a:spcBef>
-                        <a:spcAft>
-                          <a:spcPct val="0"/>
-                        </a:spcAft>
-                        <a:buClrTx/>
-                        <a:buSzTx/>
-                        <a:buFontTx/>
-                        <a:buNone/>
-                        <a:tabLst/>
-                        <a:defRPr/>
-                      </a:pPr>
-                      <a:r>
-                        <a:rPr kumimoji="0" lang="fr-FR" sz="3800" b="1" i="0" u="none" strike="noStrike" kern="1200" cap="none" spc="0" normalizeH="0" baseline="0" noProof="0" dirty="0">
-                          <a:ln>
-                            <a:noFill/>
-                          </a:ln>
-                          <a:solidFill>
-                            <a:srgbClr val="6C5098"/>
-                          </a:solidFill>
-                          <a:effectLst/>
-                          <a:uLnTx/>
-                          <a:uFillTx/>
-                          <a:latin typeface="Arial" charset="0"/>
-                          <a:ea typeface="ＭＳ Ｐゴシック" pitchFamily="34" charset="-128"/>
-                          <a:cs typeface="+mn-cs"/>
-                        </a:rPr>
-                        <a:t>La couche de convolution</a:t>
-                      </a:r>
-                      <a:r>
-                        <a:rPr kumimoji="0" lang="fr-FR" sz="3800" b="1" i="0" u="none" strike="noStrike" kern="1200" cap="none" spc="0" normalizeH="0" baseline="0" noProof="0" dirty="0">
-                          <a:ln>
-                            <a:noFill/>
-                          </a:ln>
-                          <a:solidFill>
-                            <a:srgbClr val="000000"/>
-                          </a:solidFill>
-                          <a:effectLst/>
-                          <a:uLnTx/>
-                          <a:uFillTx/>
-                          <a:latin typeface="Arial" charset="0"/>
-                          <a:ea typeface="ＭＳ Ｐゴシック" pitchFamily="34" charset="-128"/>
-                          <a:cs typeface="+mn-cs"/>
-                        </a:rPr>
-                        <a:t> </a:t>
-                      </a:r>
-                    </a:p>
-                    <a:p>
-                      <a:pPr marL="0" marR="0" lvl="0" indent="0" algn="ctr" defTabSz="914400" rtl="0" eaLnBrk="0" fontAlgn="base" latinLnBrk="0" hangingPunct="0">
-                        <a:lnSpc>
-                          <a:spcPct val="100000"/>
-                        </a:lnSpc>
-                        <a:spcBef>
-                          <a:spcPct val="0"/>
-                        </a:spcBef>
-                        <a:spcAft>
-                          <a:spcPct val="0"/>
-                        </a:spcAft>
-                        <a:buClrTx/>
-                        <a:buSzTx/>
-                        <a:buFontTx/>
-                        <a:buNone/>
-                        <a:tabLst/>
-                        <a:defRPr/>
-                      </a:pPr>
-                      <a:r>
-                        <a:rPr kumimoji="0" lang="fr-FR" sz="3800" b="0" i="0" u="none" strike="noStrike" kern="1200" cap="none" spc="0" normalizeH="0" baseline="0" noProof="0" dirty="0">
-                          <a:ln>
-                            <a:noFill/>
-                          </a:ln>
-                          <a:solidFill>
-                            <a:srgbClr val="000000"/>
-                          </a:solidFill>
-                          <a:effectLst/>
-                          <a:uLnTx/>
-                          <a:uFillTx/>
-                          <a:latin typeface="Arial" charset="0"/>
-                          <a:ea typeface="ＭＳ Ｐゴシック" pitchFamily="34" charset="-128"/>
-                          <a:cs typeface="+mn-cs"/>
-                        </a:rPr>
-                        <a:t>détecte la présence d'un ensemble de caractéristiques dans les images données en entrée.</a:t>
-                      </a:r>
-                    </a:p>
-                    <a:p>
-                      <a:endParaRPr lang="en-GB" dirty="0"/>
-                    </a:p>
-                  </a:txBody>
-                  <a:tcPr>
-                    <a:noFill/>
-                  </a:tcPr>
-                </a:tc>
-                <a:tc>
-                  <a:txBody>
-                    <a:bodyPr/>
-                    <a:lstStyle/>
-                    <a:p>
-                      <a:pPr marL="0" marR="0" lvl="0" indent="0" algn="ctr" defTabSz="914400" rtl="0" eaLnBrk="0" fontAlgn="base" latinLnBrk="0" hangingPunct="0">
-                        <a:lnSpc>
-                          <a:spcPct val="100000"/>
-                        </a:lnSpc>
-                        <a:spcBef>
-                          <a:spcPct val="0"/>
-                        </a:spcBef>
-                        <a:spcAft>
-                          <a:spcPct val="0"/>
-                        </a:spcAft>
-                        <a:buClrTx/>
-                        <a:buSzTx/>
-                        <a:buFontTx/>
-                        <a:buNone/>
-                        <a:tabLst/>
-                        <a:defRPr/>
-                      </a:pPr>
-                      <a:r>
-                        <a:rPr kumimoji="0" lang="fr-FR" sz="3800" b="1" i="0" u="none" strike="noStrike" kern="1200" cap="none" spc="0" normalizeH="0" baseline="0" noProof="0" dirty="0">
-                          <a:ln>
-                            <a:noFill/>
-                          </a:ln>
-                          <a:solidFill>
-                            <a:srgbClr val="6C5098"/>
-                          </a:solidFill>
-                          <a:effectLst/>
-                          <a:uLnTx/>
-                          <a:uFillTx/>
-                          <a:latin typeface="Arial" charset="0"/>
-                          <a:ea typeface="ＭＳ Ｐゴシック" pitchFamily="34" charset="-128"/>
-                          <a:cs typeface="+mn-cs"/>
-                        </a:rPr>
-                        <a:t>La couche de </a:t>
-                      </a:r>
-                      <a:r>
-                        <a:rPr kumimoji="0" lang="en-US" sz="3800" b="1" i="0" u="none" strike="noStrike" kern="1200" cap="none" spc="0" normalizeH="0" baseline="0" noProof="0" dirty="0">
-                          <a:ln>
-                            <a:noFill/>
-                          </a:ln>
-                          <a:solidFill>
-                            <a:srgbClr val="6C5098"/>
-                          </a:solidFill>
-                          <a:effectLst/>
-                          <a:uLnTx/>
-                          <a:uFillTx/>
-                          <a:latin typeface="Arial" charset="0"/>
-                          <a:ea typeface="ＭＳ Ｐゴシック" pitchFamily="34" charset="-128"/>
-                          <a:cs typeface="+mn-cs"/>
-                        </a:rPr>
-                        <a:t>pooling</a:t>
-                      </a:r>
-                      <a:endParaRPr kumimoji="0" lang="en-US" sz="3800" b="1" i="0" u="none" strike="noStrike" kern="1200" cap="none" spc="0" normalizeH="0" baseline="0" noProof="0" dirty="0">
-                        <a:ln>
-                          <a:noFill/>
-                        </a:ln>
-                        <a:solidFill>
-                          <a:srgbClr val="000000"/>
-                        </a:solidFill>
-                        <a:effectLst/>
-                        <a:uLnTx/>
-                        <a:uFillTx/>
-                        <a:latin typeface="Arial" charset="0"/>
-                        <a:ea typeface="ＭＳ Ｐゴシック" pitchFamily="34" charset="-128"/>
-                        <a:cs typeface="+mn-cs"/>
-                      </a:endParaRPr>
-                    </a:p>
-                    <a:p>
-                      <a:pPr marL="0" marR="0" lvl="0" indent="0" algn="ctr" defTabSz="914400" rtl="0" eaLnBrk="0" fontAlgn="base" latinLnBrk="0" hangingPunct="0">
-                        <a:lnSpc>
-                          <a:spcPct val="100000"/>
-                        </a:lnSpc>
-                        <a:spcBef>
-                          <a:spcPct val="0"/>
-                        </a:spcBef>
-                        <a:spcAft>
-                          <a:spcPct val="0"/>
-                        </a:spcAft>
-                        <a:buClrTx/>
-                        <a:buSzTx/>
-                        <a:buFontTx/>
-                        <a:buNone/>
-                        <a:tabLst/>
-                        <a:defRPr/>
-                      </a:pPr>
-                      <a:r>
-                        <a:rPr kumimoji="0" lang="fr-FR" sz="3800" b="0" i="0" u="none" strike="noStrike" kern="1200" cap="none" spc="0" normalizeH="0" baseline="0" noProof="0" dirty="0">
-                          <a:ln>
-                            <a:noFill/>
-                          </a:ln>
-                          <a:solidFill>
-                            <a:srgbClr val="000000"/>
-                          </a:solidFill>
-                          <a:effectLst/>
-                          <a:uLnTx/>
-                          <a:uFillTx/>
-                          <a:latin typeface="Arial" charset="0"/>
-                          <a:ea typeface="ＭＳ Ｐゴシック" pitchFamily="34" charset="-128"/>
-                          <a:cs typeface="+mn-cs"/>
-                        </a:rPr>
-                        <a:t>réduit la taille d'un ensemble de caractéristiques tout en préservant les plus importantes.</a:t>
-                      </a:r>
-                    </a:p>
-                    <a:p>
-                      <a:endParaRPr lang="en-GB" dirty="0"/>
-                    </a:p>
-                  </a:txBody>
-                  <a:tcPr>
-                    <a:noFill/>
-                  </a:tcPr>
-                </a:tc>
-                <a:extLst>
-                  <a:ext uri="{0D108BD9-81ED-4DB2-BD59-A6C34878D82A}">
-                    <a16:rowId xmlns:a16="http://schemas.microsoft.com/office/drawing/2014/main" val="2872119397"/>
-                  </a:ext>
-                </a:extLst>
-              </a:tr>
-            </a:tbl>
-          </a:graphicData>
-        </a:graphic>
-      </p:graphicFrame>
-      <p:graphicFrame>
-        <p:nvGraphicFramePr>
-          <p:cNvPr id="46" name="Table 18">
-            <a:extLst>
-              <a:ext uri="{FF2B5EF4-FFF2-40B4-BE49-F238E27FC236}">
-                <a16:creationId xmlns:a16="http://schemas.microsoft.com/office/drawing/2014/main" id="{AA2B973D-9A5C-4F9D-93D8-F7CCFDC59497}"/>
-              </a:ext>
-            </a:extLst>
-          </p:cNvPr>
-          <p:cNvGraphicFramePr>
-            <a:graphicFrameLocks noGrp="1"/>
-          </p:cNvGraphicFramePr>
-          <p:nvPr>
-            <p:extLst>
-              <p:ext uri="{D42A27DB-BD31-4B8C-83A1-F6EECF244321}">
-                <p14:modId xmlns:p14="http://schemas.microsoft.com/office/powerpoint/2010/main" val="850409069"/>
-              </p:ext>
-            </p:extLst>
-          </p:nvPr>
-        </p:nvGraphicFramePr>
-        <p:xfrm>
-          <a:off x="18050451" y="23897064"/>
-          <a:ext cx="13362502" cy="5685150"/>
-        </p:xfrm>
-        <a:graphic>
-          <a:graphicData uri="http://schemas.openxmlformats.org/drawingml/2006/table">
-            <a:tbl>
-              <a:tblPr firstRow="1" bandRow="1">
-                <a:tableStyleId>{5C22544A-7EE6-4342-B048-85BDC9FD1C3A}</a:tableStyleId>
-              </a:tblPr>
-              <a:tblGrid>
-                <a:gridCol w="6681251">
-                  <a:extLst>
-                    <a:ext uri="{9D8B030D-6E8A-4147-A177-3AD203B41FA5}">
-                      <a16:colId xmlns:a16="http://schemas.microsoft.com/office/drawing/2014/main" val="1643344713"/>
-                    </a:ext>
-                  </a:extLst>
-                </a:gridCol>
-                <a:gridCol w="6681251">
-                  <a:extLst>
-                    <a:ext uri="{9D8B030D-6E8A-4147-A177-3AD203B41FA5}">
-                      <a16:colId xmlns:a16="http://schemas.microsoft.com/office/drawing/2014/main" val="2838925563"/>
-                    </a:ext>
-                  </a:extLst>
-                </a:gridCol>
-              </a:tblGrid>
-              <a:tr h="1844670">
-                <a:tc gridSpan="2">
-                  <a:txBody>
-                    <a:bodyPr/>
-                    <a:lstStyle/>
-                    <a:p>
-                      <a:pPr algn="ctr"/>
-                      <a:r>
-                        <a:rPr lang="fr-FR" sz="3800" noProof="0" dirty="0">
-                          <a:solidFill>
-                            <a:srgbClr val="6C5098"/>
-                          </a:solidFill>
-                        </a:rPr>
-                        <a:t>Bloc Classifieur</a:t>
-                      </a:r>
-                    </a:p>
-                    <a:p>
-                      <a:pPr algn="ctr"/>
-                      <a:r>
-                        <a:rPr lang="fr-FR" sz="3800" b="0" dirty="0">
-                          <a:solidFill>
-                            <a:schemeClr val="tx1"/>
-                          </a:solidFill>
-                        </a:rPr>
-                        <a:t>  étant donné les caractéristiques des images,</a:t>
-                      </a:r>
-                    </a:p>
-                    <a:p>
-                      <a:pPr algn="ctr"/>
-                      <a:r>
-                        <a:rPr lang="fr-FR" sz="3800" b="0" dirty="0">
-                          <a:solidFill>
-                            <a:schemeClr val="tx1"/>
-                          </a:solidFill>
-                        </a:rPr>
-                        <a:t>détermine à quelle classe appartient l'image.</a:t>
-                      </a:r>
-                      <a:endParaRPr lang="en-GB" sz="3800" b="0" dirty="0">
-                        <a:solidFill>
-                          <a:schemeClr val="tx1"/>
-                        </a:solidFill>
-                      </a:endParaRPr>
-                    </a:p>
-                  </a:txBody>
-                  <a:tcPr>
-                    <a:noFill/>
-                  </a:tcPr>
-                </a:tc>
-                <a:tc hMerge="1">
-                  <a:txBody>
-                    <a:bodyPr/>
-                    <a:lstStyle/>
-                    <a:p>
-                      <a:endParaRPr lang="en-GB" dirty="0"/>
-                    </a:p>
-                  </a:txBody>
-                  <a:tcPr/>
-                </a:tc>
-                <a:extLst>
-                  <a:ext uri="{0D108BD9-81ED-4DB2-BD59-A6C34878D82A}">
-                    <a16:rowId xmlns:a16="http://schemas.microsoft.com/office/drawing/2014/main" val="1993528755"/>
-                  </a:ext>
-                </a:extLst>
-              </a:tr>
-              <a:tr h="3469237">
-                <a:tc>
-                  <a:txBody>
-                    <a:bodyPr/>
-                    <a:lstStyle/>
-                    <a:p>
-                      <a:pPr marL="0" marR="0" lvl="0" indent="0" algn="ctr" defTabSz="914400" rtl="0" eaLnBrk="0" fontAlgn="base" latinLnBrk="0" hangingPunct="0">
-                        <a:lnSpc>
-                          <a:spcPct val="100000"/>
-                        </a:lnSpc>
-                        <a:spcBef>
-                          <a:spcPct val="0"/>
-                        </a:spcBef>
-                        <a:spcAft>
-                          <a:spcPct val="0"/>
-                        </a:spcAft>
-                        <a:buClrTx/>
-                        <a:buSzTx/>
-                        <a:buFontTx/>
-                        <a:buNone/>
-                        <a:tabLst/>
-                        <a:defRPr/>
-                      </a:pPr>
-                      <a:r>
-                        <a:rPr kumimoji="0" lang="fr-FR" sz="3800" b="1" i="0" u="none" strike="noStrike" kern="1200" cap="none" spc="0" normalizeH="0" baseline="0" noProof="0" dirty="0">
-                          <a:ln>
-                            <a:noFill/>
-                          </a:ln>
-                          <a:solidFill>
-                            <a:srgbClr val="6C5098"/>
-                          </a:solidFill>
-                          <a:effectLst/>
-                          <a:uLnTx/>
-                          <a:uFillTx/>
-                          <a:latin typeface="Arial" charset="0"/>
-                          <a:ea typeface="ＭＳ Ｐゴシック" pitchFamily="34" charset="-128"/>
-                          <a:cs typeface="+mn-cs"/>
-                        </a:rPr>
-                        <a:t>La couche de correction ReLU</a:t>
-                      </a:r>
-                    </a:p>
-                    <a:p>
-                      <a:pPr marL="0" marR="0" lvl="0" indent="0" algn="ctr" defTabSz="914400" rtl="0" eaLnBrk="0" fontAlgn="base" latinLnBrk="0" hangingPunct="0">
-                        <a:lnSpc>
-                          <a:spcPct val="100000"/>
-                        </a:lnSpc>
-                        <a:spcBef>
-                          <a:spcPct val="0"/>
-                        </a:spcBef>
-                        <a:spcAft>
-                          <a:spcPct val="0"/>
-                        </a:spcAft>
-                        <a:buClrTx/>
-                        <a:buSzTx/>
-                        <a:buFontTx/>
-                        <a:buNone/>
-                        <a:tabLst/>
-                        <a:defRPr/>
-                      </a:pPr>
-                      <a:endParaRPr kumimoji="0" lang="fr-FR" sz="3800" b="0" i="0" u="none" strike="noStrike" kern="1200" cap="none" spc="0" normalizeH="0" baseline="0" noProof="0" dirty="0">
-                        <a:ln>
-                          <a:noFill/>
-                        </a:ln>
-                        <a:solidFill>
-                          <a:srgbClr val="000000"/>
-                        </a:solidFill>
-                        <a:effectLst/>
-                        <a:uLnTx/>
-                        <a:uFillTx/>
-                        <a:latin typeface="Arial" charset="0"/>
-                        <a:ea typeface="ＭＳ Ｐゴシック" pitchFamily="34" charset="-128"/>
-                        <a:cs typeface="+mn-cs"/>
-                      </a:endParaRPr>
-                    </a:p>
-                    <a:p>
-                      <a:pPr marL="0" marR="0" lvl="0" indent="0" algn="ctr" defTabSz="914400" rtl="0" eaLnBrk="0" fontAlgn="base" latinLnBrk="0" hangingPunct="0">
-                        <a:lnSpc>
-                          <a:spcPct val="100000"/>
-                        </a:lnSpc>
-                        <a:spcBef>
-                          <a:spcPct val="0"/>
-                        </a:spcBef>
-                        <a:spcAft>
-                          <a:spcPct val="0"/>
-                        </a:spcAft>
-                        <a:buClrTx/>
-                        <a:buSzTx/>
-                        <a:buFontTx/>
-                        <a:buNone/>
-                        <a:tabLst/>
-                        <a:defRPr/>
-                      </a:pPr>
-                      <a:r>
-                        <a:rPr kumimoji="0" lang="fr-FR" sz="3800" b="0" i="0" u="none" strike="noStrike" kern="1200" cap="none" spc="0" normalizeH="0" baseline="0" noProof="0" dirty="0">
-                          <a:ln>
-                            <a:noFill/>
-                          </a:ln>
-                          <a:solidFill>
-                            <a:srgbClr val="000000"/>
-                          </a:solidFill>
-                          <a:effectLst/>
-                          <a:uLnTx/>
-                          <a:uFillTx/>
-                          <a:latin typeface="Arial" charset="0"/>
-                          <a:ea typeface="ＭＳ Ｐゴシック" pitchFamily="34" charset="-128"/>
-                          <a:cs typeface="+mn-cs"/>
-                        </a:rPr>
-                        <a:t>est une fonction d’activation, remplace les valeurs négatives par des zéros.</a:t>
-                      </a:r>
-                      <a:endParaRPr kumimoji="0" lang="fr-FR" sz="3800" b="1" i="0" u="none" strike="noStrike" kern="1200" cap="none" spc="0" normalizeH="0" baseline="0" noProof="0" dirty="0">
-                        <a:ln>
-                          <a:noFill/>
-                        </a:ln>
-                        <a:solidFill>
-                          <a:srgbClr val="000000"/>
-                        </a:solidFill>
-                        <a:effectLst/>
-                        <a:uLnTx/>
-                        <a:uFillTx/>
-                        <a:latin typeface="Arial" charset="0"/>
-                        <a:ea typeface="ＭＳ Ｐゴシック" pitchFamily="34" charset="-128"/>
-                        <a:cs typeface="+mn-cs"/>
-                      </a:endParaRPr>
-                    </a:p>
-                    <a:p>
-                      <a:endParaRPr lang="en-GB" dirty="0"/>
-                    </a:p>
-                  </a:txBody>
-                  <a:tcPr>
-                    <a:noFill/>
-                  </a:tcPr>
-                </a:tc>
-                <a:tc>
-                  <a:txBody>
-                    <a:bodyPr/>
-                    <a:lstStyle/>
-                    <a:p>
-                      <a:pPr marL="0" marR="0" lvl="0" indent="0" algn="ctr" defTabSz="914400" rtl="0" eaLnBrk="0" fontAlgn="base" latinLnBrk="0" hangingPunct="0">
-                        <a:lnSpc>
-                          <a:spcPct val="100000"/>
-                        </a:lnSpc>
-                        <a:spcBef>
-                          <a:spcPct val="0"/>
-                        </a:spcBef>
-                        <a:spcAft>
-                          <a:spcPct val="0"/>
-                        </a:spcAft>
-                        <a:buClrTx/>
-                        <a:buSzTx/>
-                        <a:buFontTx/>
-                        <a:buNone/>
-                        <a:tabLst/>
-                        <a:defRPr/>
-                      </a:pPr>
-                      <a:r>
-                        <a:rPr kumimoji="0" lang="fr-FR" sz="3800" b="1" i="0" u="none" strike="noStrike" kern="1200" cap="none" spc="0" normalizeH="0" baseline="0" noProof="0" dirty="0">
-                          <a:ln>
-                            <a:noFill/>
-                          </a:ln>
-                          <a:solidFill>
-                            <a:srgbClr val="6C5098"/>
-                          </a:solidFill>
-                          <a:effectLst/>
-                          <a:uLnTx/>
-                          <a:uFillTx/>
-                          <a:latin typeface="Arial" charset="0"/>
-                          <a:ea typeface="ＭＳ Ｐゴシック" pitchFamily="34" charset="-128"/>
-                          <a:cs typeface="+mn-cs"/>
-                        </a:rPr>
-                        <a:t>La couche fully-connected</a:t>
-                      </a:r>
-                    </a:p>
-                    <a:p>
-                      <a:pPr marL="0" marR="0" lvl="0" indent="0" algn="ctr" defTabSz="914400" rtl="0" eaLnBrk="0" fontAlgn="base" latinLnBrk="0" hangingPunct="0">
-                        <a:lnSpc>
-                          <a:spcPct val="100000"/>
-                        </a:lnSpc>
-                        <a:spcBef>
-                          <a:spcPct val="0"/>
-                        </a:spcBef>
-                        <a:spcAft>
-                          <a:spcPct val="0"/>
-                        </a:spcAft>
-                        <a:buClrTx/>
-                        <a:buSzTx/>
-                        <a:buFontTx/>
-                        <a:buNone/>
-                        <a:tabLst/>
-                        <a:defRPr/>
-                      </a:pPr>
-                      <a:endParaRPr kumimoji="0" lang="fr-FR" sz="3800" b="0" i="0" u="none" strike="noStrike" kern="1200" cap="none" spc="0" normalizeH="0" baseline="0" noProof="0" dirty="0">
-                        <a:ln>
-                          <a:noFill/>
-                        </a:ln>
-                        <a:solidFill>
-                          <a:srgbClr val="000000"/>
-                        </a:solidFill>
-                        <a:effectLst/>
-                        <a:uLnTx/>
-                        <a:uFillTx/>
-                        <a:latin typeface="Arial" charset="0"/>
-                        <a:ea typeface="ＭＳ Ｐゴシック" pitchFamily="34" charset="-128"/>
-                        <a:cs typeface="+mn-cs"/>
-                      </a:endParaRPr>
-                    </a:p>
-                    <a:p>
-                      <a:pPr marL="0" marR="0" lvl="0" indent="0" algn="ctr" defTabSz="914400" rtl="0" eaLnBrk="0" fontAlgn="base" latinLnBrk="0" hangingPunct="0">
-                        <a:lnSpc>
-                          <a:spcPct val="100000"/>
-                        </a:lnSpc>
-                        <a:spcBef>
-                          <a:spcPct val="0"/>
-                        </a:spcBef>
-                        <a:spcAft>
-                          <a:spcPct val="0"/>
-                        </a:spcAft>
-                        <a:buClrTx/>
-                        <a:buSzTx/>
-                        <a:buFontTx/>
-                        <a:buNone/>
-                        <a:tabLst/>
-                        <a:defRPr/>
-                      </a:pPr>
-                      <a:r>
-                        <a:rPr kumimoji="0" lang="fr-FR" sz="3800" b="0" i="0" u="none" strike="noStrike" kern="1200" cap="none" spc="0" normalizeH="0" baseline="0" noProof="0" dirty="0">
-                          <a:ln>
-                            <a:noFill/>
-                          </a:ln>
-                          <a:solidFill>
-                            <a:srgbClr val="000000"/>
-                          </a:solidFill>
-                          <a:effectLst/>
-                          <a:uLnTx/>
-                          <a:uFillTx/>
-                          <a:latin typeface="Arial" charset="0"/>
-                          <a:ea typeface="ＭＳ Ｐゴシック" pitchFamily="34" charset="-128"/>
-                          <a:cs typeface="+mn-cs"/>
-                        </a:rPr>
-                        <a:t>transforme un vecteur en un autre en appliquant une combinaison linéaire avec ou sans fonction d’activation.</a:t>
-                      </a:r>
-                      <a:endParaRPr kumimoji="0" lang="fr-FR" sz="3800" b="1" i="0" u="none" strike="noStrike" kern="1200" cap="none" spc="0" normalizeH="0" baseline="0" noProof="0" dirty="0">
-                        <a:ln>
-                          <a:noFill/>
-                        </a:ln>
-                        <a:solidFill>
-                          <a:srgbClr val="000000"/>
-                        </a:solidFill>
-                        <a:effectLst/>
-                        <a:uLnTx/>
-                        <a:uFillTx/>
-                        <a:latin typeface="Arial" charset="0"/>
-                        <a:ea typeface="ＭＳ Ｐゴシック" pitchFamily="34" charset="-128"/>
-                        <a:cs typeface="+mn-cs"/>
-                      </a:endParaRPr>
-                    </a:p>
-                    <a:p>
-                      <a:endParaRPr lang="en-GB" dirty="0"/>
-                    </a:p>
-                  </a:txBody>
-                  <a:tcPr>
-                    <a:noFill/>
-                  </a:tcPr>
-                </a:tc>
-                <a:extLst>
-                  <a:ext uri="{0D108BD9-81ED-4DB2-BD59-A6C34878D82A}">
-                    <a16:rowId xmlns:a16="http://schemas.microsoft.com/office/drawing/2014/main" val="2872119397"/>
-                  </a:ext>
-                </a:extLst>
-              </a:tr>
-            </a:tbl>
-          </a:graphicData>
-        </a:graphic>
-      </p:graphicFrame>
-      <p:sp>
-        <p:nvSpPr>
-          <p:cNvPr id="47" name="Rectangle: Rounded Corners 46">
-            <a:extLst>
-              <a:ext uri="{FF2B5EF4-FFF2-40B4-BE49-F238E27FC236}">
-                <a16:creationId xmlns:a16="http://schemas.microsoft.com/office/drawing/2014/main" id="{9B404301-BCD4-4CF8-BDA2-CA4F6D43544B}"/>
+                <a16:creationId xmlns:a16="http://schemas.microsoft.com/office/drawing/2014/main" id="{D0E09CBB-AE99-4992-9275-EBAD5CA06971}"/>
               </a:ext>
             </a:extLst>
           </p:cNvPr>
@@ -7128,13 +6147,15 @@
         </p:nvSpPr>
         <p:spPr bwMode="auto">
           <a:xfrm>
-            <a:off x="18166609" y="18648052"/>
-            <a:ext cx="13307903" cy="4933442"/>
+            <a:off x="18200003" y="23797518"/>
+            <a:ext cx="13307903" cy="6242509"/>
           </a:xfrm>
           <a:prstGeom prst="roundRect">
             <a:avLst/>
           </a:prstGeom>
-          <a:noFill/>
+          <a:solidFill>
+            <a:schemeClr val="bg1"/>
+          </a:solidFill>
           <a:ln w="9525" cap="flat" cmpd="sng" algn="ctr">
             <a:solidFill>
               <a:srgbClr val="6C5098"/>
@@ -7184,76 +6205,6 @@
           </a:p>
         </p:txBody>
       </p:sp>
-      <p:sp>
-        <p:nvSpPr>
-          <p:cNvPr id="48" name="Rectangle: Rounded Corners 47">
-            <a:extLst>
-              <a:ext uri="{FF2B5EF4-FFF2-40B4-BE49-F238E27FC236}">
-                <a16:creationId xmlns:a16="http://schemas.microsoft.com/office/drawing/2014/main" id="{D0E09CBB-AE99-4992-9275-EBAD5CA06971}"/>
-              </a:ext>
-            </a:extLst>
-          </p:cNvPr>
-          <p:cNvSpPr/>
-          <p:nvPr/>
-        </p:nvSpPr>
-        <p:spPr bwMode="auto">
-          <a:xfrm>
-            <a:off x="18200003" y="23797518"/>
-            <a:ext cx="13307903" cy="6242509"/>
-          </a:xfrm>
-          <a:prstGeom prst="roundRect">
-            <a:avLst/>
-          </a:prstGeom>
-          <a:noFill/>
-          <a:ln w="9525" cap="flat" cmpd="sng" algn="ctr">
-            <a:solidFill>
-              <a:srgbClr val="6C5098"/>
-            </a:solidFill>
-            <a:prstDash val="solid"/>
-            <a:round/>
-            <a:headEnd type="none" w="med" len="med"/>
-            <a:tailEnd type="none" w="med" len="med"/>
-          </a:ln>
-          <a:effectLst/>
-        </p:spPr>
-        <p:txBody>
-          <a:bodyPr vert="horz" wrap="square" lIns="91440" tIns="45720" rIns="91440" bIns="45720" numCol="1" rtlCol="0" anchor="t" anchorCtr="0" compatLnSpc="1">
-            <a:prstTxWarp prst="textNoShape">
-              <a:avLst/>
-            </a:prstTxWarp>
-          </a:bodyPr>
-          <a:lstStyle/>
-          <a:p>
-            <a:pPr marL="0" marR="0" indent="0" algn="l" defTabSz="914400" rtl="0" eaLnBrk="0" fontAlgn="base" latinLnBrk="0" hangingPunct="0">
-              <a:lnSpc>
-                <a:spcPct val="100000"/>
-              </a:lnSpc>
-              <a:spcBef>
-                <a:spcPct val="0"/>
-              </a:spcBef>
-              <a:spcAft>
-                <a:spcPct val="0"/>
-              </a:spcAft>
-              <a:buClrTx/>
-              <a:buSzTx/>
-              <a:buFontTx/>
-              <a:buNone/>
-              <a:tabLst/>
-            </a:pPr>
-            <a:endParaRPr kumimoji="0" lang="en-GB" sz="2400" b="0" i="0" u="none" strike="noStrike" cap="none" normalizeH="0" baseline="0" dirty="0">
-              <a:ln>
-                <a:noFill/>
-              </a:ln>
-              <a:solidFill>
-                <a:schemeClr val="tx1"/>
-              </a:solidFill>
-              <a:effectLst/>
-              <a:latin typeface="Arial" charset="0"/>
-              <a:ea typeface="ＭＳ Ｐゴシック" pitchFamily="1" charset="-128"/>
-            </a:endParaRPr>
-          </a:p>
-        </p:txBody>
-      </p:sp>
       <p:pic>
         <p:nvPicPr>
           <p:cNvPr id="23" name="Graphic 22">
@@ -7269,13 +6220,13 @@
           <p:nvPr/>
         </p:nvPicPr>
         <p:blipFill rotWithShape="1">
-          <a:blip r:embed="rId14">
+          <a:blip r:embed="rId9">
             <a:extLst>
               <a:ext uri="{28A0092B-C50C-407E-A947-70E740481C1C}">
                 <a14:useLocalDpi xmlns:a14="http://schemas.microsoft.com/office/drawing/2010/main" val="0"/>
               </a:ext>
               <a:ext uri="{96DAC541-7B7A-43D3-8B79-37D633B846F1}">
-                <asvg:svgBlip xmlns:asvg="http://schemas.microsoft.com/office/drawing/2016/SVG/main" r:embed="rId15"/>
+                <asvg:svgBlip xmlns:asvg="http://schemas.microsoft.com/office/drawing/2016/SVG/main" r:embed="rId10"/>
               </a:ext>
             </a:extLst>
           </a:blip>
@@ -7286,181 +6237,6 @@
           <a:xfrm>
             <a:off x="18682662" y="26893862"/>
             <a:ext cx="5615885" cy="730575"/>
-          </a:xfrm>
-          <a:prstGeom prst="rect">
-            <a:avLst/>
-          </a:prstGeom>
-        </p:spPr>
-      </p:pic>
-      <p:pic>
-        <p:nvPicPr>
-          <p:cNvPr id="7" name="Picture 6" descr="A picture containing clock&#10;&#10;Description automatically generated">
-            <a:extLst>
-              <a:ext uri="{FF2B5EF4-FFF2-40B4-BE49-F238E27FC236}">
-                <a16:creationId xmlns:a16="http://schemas.microsoft.com/office/drawing/2014/main" id="{4F4BC309-E76C-4067-B176-5E35013B0A9B}"/>
-              </a:ext>
-            </a:extLst>
-          </p:cNvPr>
-          <p:cNvPicPr>
-            <a:picLocks noChangeAspect="1"/>
-          </p:cNvPicPr>
-          <p:nvPr/>
-        </p:nvPicPr>
-        <p:blipFill rotWithShape="1">
-          <a:blip r:embed="rId16">
-            <a:extLst>
-              <a:ext uri="{28A0092B-C50C-407E-A947-70E740481C1C}">
-                <a14:useLocalDpi xmlns:a14="http://schemas.microsoft.com/office/drawing/2010/main" val="0"/>
-              </a:ext>
-            </a:extLst>
-          </a:blip>
-          <a:srcRect l="6557" t="44087" r="48323" b="6538"/>
-          <a:stretch/>
-        </p:blipFill>
-        <p:spPr>
-          <a:xfrm>
-            <a:off x="13008637" y="14580494"/>
-            <a:ext cx="2864974" cy="2353787"/>
-          </a:xfrm>
-          <a:prstGeom prst="rect">
-            <a:avLst/>
-          </a:prstGeom>
-        </p:spPr>
-      </p:pic>
-      <p:pic>
-        <p:nvPicPr>
-          <p:cNvPr id="17" name="Picture 16" descr="A picture containing remote&#10;&#10;Description automatically generated">
-            <a:extLst>
-              <a:ext uri="{FF2B5EF4-FFF2-40B4-BE49-F238E27FC236}">
-                <a16:creationId xmlns:a16="http://schemas.microsoft.com/office/drawing/2014/main" id="{FB6642AD-8A13-4C41-95A4-DA47CB163C14}"/>
-              </a:ext>
-            </a:extLst>
-          </p:cNvPr>
-          <p:cNvPicPr>
-            <a:picLocks noChangeAspect="1"/>
-          </p:cNvPicPr>
-          <p:nvPr/>
-        </p:nvPicPr>
-        <p:blipFill rotWithShape="1">
-          <a:blip r:embed="rId17">
-            <a:extLst>
-              <a:ext uri="{28A0092B-C50C-407E-A947-70E740481C1C}">
-                <a14:useLocalDpi xmlns:a14="http://schemas.microsoft.com/office/drawing/2010/main" val="0"/>
-              </a:ext>
-            </a:extLst>
-          </a:blip>
-          <a:srcRect l="24945" t="-297" r="41723" b="59968"/>
-          <a:stretch/>
-        </p:blipFill>
-        <p:spPr>
-          <a:xfrm>
-            <a:off x="3257098" y="18703070"/>
-            <a:ext cx="2516481" cy="2664046"/>
-          </a:xfrm>
-          <a:prstGeom prst="rect">
-            <a:avLst/>
-          </a:prstGeom>
-        </p:spPr>
-      </p:pic>
-      <p:pic>
-        <p:nvPicPr>
-          <p:cNvPr id="20" name="Picture 19" descr="A close up of a logo&#10;&#10;Description automatically generated">
-            <a:extLst>
-              <a:ext uri="{FF2B5EF4-FFF2-40B4-BE49-F238E27FC236}">
-                <a16:creationId xmlns:a16="http://schemas.microsoft.com/office/drawing/2014/main" id="{DD7996B2-49F6-4FCF-B8F0-3CE96A24B5FF}"/>
-              </a:ext>
-            </a:extLst>
-          </p:cNvPr>
-          <p:cNvPicPr>
-            <a:picLocks noChangeAspect="1"/>
-          </p:cNvPicPr>
-          <p:nvPr/>
-        </p:nvPicPr>
-        <p:blipFill rotWithShape="1">
-          <a:blip r:embed="rId18">
-            <a:extLst>
-              <a:ext uri="{28A0092B-C50C-407E-A947-70E740481C1C}">
-                <a14:useLocalDpi xmlns:a14="http://schemas.microsoft.com/office/drawing/2010/main" val="0"/>
-              </a:ext>
-            </a:extLst>
-          </a:blip>
-          <a:srcRect l="9377" t="18273" r="55882" b="63739"/>
-          <a:stretch/>
-        </p:blipFill>
-        <p:spPr>
-          <a:xfrm>
-            <a:off x="8115477" y="14554456"/>
-            <a:ext cx="3104789" cy="1354218"/>
-          </a:xfrm>
-          <a:prstGeom prst="rect">
-            <a:avLst/>
-          </a:prstGeom>
-        </p:spPr>
-      </p:pic>
-      <p:pic>
-        <p:nvPicPr>
-          <p:cNvPr id="32" name="Picture 31" descr="A picture containing drawing&#10;&#10;Description automatically generated">
-            <a:extLst>
-              <a:ext uri="{FF2B5EF4-FFF2-40B4-BE49-F238E27FC236}">
-                <a16:creationId xmlns:a16="http://schemas.microsoft.com/office/drawing/2014/main" id="{DF71E793-94AD-456F-BE1A-E517AEF82F4A}"/>
-              </a:ext>
-            </a:extLst>
-          </p:cNvPr>
-          <p:cNvPicPr>
-            <a:picLocks noChangeAspect="1"/>
-          </p:cNvPicPr>
-          <p:nvPr/>
-        </p:nvPicPr>
-        <p:blipFill rotWithShape="1">
-          <a:blip r:embed="rId19">
-            <a:extLst>
-              <a:ext uri="{28A0092B-C50C-407E-A947-70E740481C1C}">
-                <a14:useLocalDpi xmlns:a14="http://schemas.microsoft.com/office/drawing/2010/main" val="0"/>
-              </a:ext>
-            </a:extLst>
-          </a:blip>
-          <a:srcRect l="2426" t="78993" r="73828" b="7673"/>
-          <a:stretch/>
-        </p:blipFill>
-        <p:spPr>
-          <a:xfrm>
-            <a:off x="12608624" y="18597062"/>
-            <a:ext cx="3442317" cy="2679889"/>
-          </a:xfrm>
-          <a:prstGeom prst="rect">
-            <a:avLst/>
-          </a:prstGeom>
-        </p:spPr>
-      </p:pic>
-      <p:pic>
-        <p:nvPicPr>
-          <p:cNvPr id="34" name="Picture 33" descr="A close up of a logo&#10;&#10;Description automatically generated">
-            <a:extLst>
-              <a:ext uri="{FF2B5EF4-FFF2-40B4-BE49-F238E27FC236}">
-                <a16:creationId xmlns:a16="http://schemas.microsoft.com/office/drawing/2014/main" id="{EED5F03A-6C47-4377-9022-611ED9490030}"/>
-              </a:ext>
-            </a:extLst>
-          </p:cNvPr>
-          <p:cNvPicPr>
-            <a:picLocks noChangeAspect="1"/>
-          </p:cNvPicPr>
-          <p:nvPr/>
-        </p:nvPicPr>
-        <p:blipFill rotWithShape="1">
-          <a:blip r:embed="rId20">
-            <a:extLst>
-              <a:ext uri="{28A0092B-C50C-407E-A947-70E740481C1C}">
-                <a14:useLocalDpi xmlns:a14="http://schemas.microsoft.com/office/drawing/2010/main" val="0"/>
-              </a:ext>
-            </a:extLst>
-          </a:blip>
-          <a:srcRect l="463" t="45343" r="73765" b="31712"/>
-          <a:stretch/>
-        </p:blipFill>
-        <p:spPr>
-          <a:xfrm>
-            <a:off x="7865507" y="18661167"/>
-            <a:ext cx="2792127" cy="2066252"/>
           </a:xfrm>
           <a:prstGeom prst="rect">
             <a:avLst/>
@@ -7487,7 +6263,9 @@
           <a:prstGeom prst="roundRect">
             <a:avLst/>
           </a:prstGeom>
-          <a:noFill/>
+          <a:solidFill>
+            <a:schemeClr val="bg1"/>
+          </a:solidFill>
           <a:ln w="9525" cap="flat" cmpd="sng" algn="ctr">
             <a:solidFill>
               <a:srgbClr val="6C5098"/>
@@ -7683,150 +6461,6 @@
       </p:sp>
       <p:sp>
         <p:nvSpPr>
-          <p:cNvPr id="67" name="Arrow: Right 66">
-            <a:extLst>
-              <a:ext uri="{FF2B5EF4-FFF2-40B4-BE49-F238E27FC236}">
-                <a16:creationId xmlns:a16="http://schemas.microsoft.com/office/drawing/2014/main" id="{B7BF118F-202B-4A08-83A9-E3734815C270}"/>
-              </a:ext>
-            </a:extLst>
-          </p:cNvPr>
-          <p:cNvSpPr/>
-          <p:nvPr/>
-        </p:nvSpPr>
-        <p:spPr bwMode="auto">
-          <a:xfrm rot="20445938">
-            <a:off x="5884795" y="19521320"/>
-            <a:ext cx="1755918" cy="592460"/>
-          </a:xfrm>
-          <a:prstGeom prst="rightArrow">
-            <a:avLst/>
-          </a:prstGeom>
-          <a:solidFill>
-            <a:srgbClr val="6C5098"/>
-          </a:solidFill>
-          <a:ln w="9525" cap="flat" cmpd="sng" algn="ctr">
-            <a:solidFill>
-              <a:schemeClr val="tx1"/>
-            </a:solidFill>
-            <a:prstDash val="solid"/>
-            <a:round/>
-            <a:headEnd type="none" w="med" len="med"/>
-            <a:tailEnd type="none" w="med" len="med"/>
-          </a:ln>
-          <a:effectLst/>
-        </p:spPr>
-        <p:txBody>
-          <a:bodyPr vert="horz" wrap="square" lIns="91440" tIns="45720" rIns="91440" bIns="45720" numCol="1" rtlCol="0" anchor="t" anchorCtr="0" compatLnSpc="1">
-            <a:prstTxWarp prst="textNoShape">
-              <a:avLst/>
-            </a:prstTxWarp>
-          </a:bodyPr>
-          <a:lstStyle/>
-          <a:p>
-            <a:pPr marL="0" marR="0" indent="0" algn="l" defTabSz="914400" rtl="0" eaLnBrk="0" fontAlgn="base" latinLnBrk="0" hangingPunct="0">
-              <a:lnSpc>
-                <a:spcPct val="100000"/>
-              </a:lnSpc>
-              <a:spcBef>
-                <a:spcPct val="0"/>
-              </a:spcBef>
-              <a:spcAft>
-                <a:spcPct val="0"/>
-              </a:spcAft>
-              <a:buClrTx/>
-              <a:buSzTx/>
-              <a:buFontTx/>
-              <a:buNone/>
-              <a:tabLst/>
-            </a:pPr>
-            <a:endParaRPr kumimoji="0" lang="en-GB" sz="2400" b="0" i="0" u="none" strike="noStrike" cap="none" normalizeH="0" baseline="0">
-              <a:ln>
-                <a:noFill/>
-              </a:ln>
-              <a:solidFill>
-                <a:schemeClr val="tx1"/>
-              </a:solidFill>
-              <a:effectLst/>
-              <a:latin typeface="Arial" charset="0"/>
-              <a:ea typeface="ＭＳ Ｐゴシック" pitchFamily="1" charset="-128"/>
-            </a:endParaRPr>
-          </a:p>
-        </p:txBody>
-      </p:sp>
-      <p:sp>
-        <p:nvSpPr>
-          <p:cNvPr id="69" name="Arrow: Right 68">
-            <a:extLst>
-              <a:ext uri="{FF2B5EF4-FFF2-40B4-BE49-F238E27FC236}">
-                <a16:creationId xmlns:a16="http://schemas.microsoft.com/office/drawing/2014/main" id="{A66D563B-1809-4BC9-A4B4-4B2173DC54BD}"/>
-              </a:ext>
-            </a:extLst>
-          </p:cNvPr>
-          <p:cNvSpPr/>
-          <p:nvPr/>
-        </p:nvSpPr>
-        <p:spPr bwMode="auto">
-          <a:xfrm rot="700766">
-            <a:off x="11023732" y="19579155"/>
-            <a:ext cx="1755918" cy="592460"/>
-          </a:xfrm>
-          <a:prstGeom prst="rightArrow">
-            <a:avLst/>
-          </a:prstGeom>
-          <a:solidFill>
-            <a:srgbClr val="6C5098"/>
-          </a:solidFill>
-          <a:ln w="9525" cap="flat" cmpd="sng" algn="ctr">
-            <a:solidFill>
-              <a:schemeClr val="tx1"/>
-            </a:solidFill>
-            <a:prstDash val="solid"/>
-            <a:round/>
-            <a:headEnd type="none" w="med" len="med"/>
-            <a:tailEnd type="none" w="med" len="med"/>
-          </a:ln>
-          <a:effectLst/>
-        </p:spPr>
-        <p:txBody>
-          <a:bodyPr vert="horz" wrap="square" lIns="91440" tIns="45720" rIns="91440" bIns="45720" numCol="1" rtlCol="0" anchor="t" anchorCtr="0" compatLnSpc="1">
-            <a:prstTxWarp prst="textNoShape">
-              <a:avLst/>
-            </a:prstTxWarp>
-          </a:bodyPr>
-          <a:lstStyle/>
-          <a:p>
-            <a:pPr marL="0" marR="0" indent="0" algn="l" defTabSz="914400" rtl="0" eaLnBrk="0" fontAlgn="base" latinLnBrk="0" hangingPunct="0">
-              <a:lnSpc>
-                <a:spcPct val="100000"/>
-              </a:lnSpc>
-              <a:spcBef>
-                <a:spcPct val="0"/>
-              </a:spcBef>
-              <a:spcAft>
-                <a:spcPct val="0"/>
-              </a:spcAft>
-              <a:buClrTx/>
-              <a:buSzTx/>
-              <a:buFontTx/>
-              <a:buNone/>
-              <a:tabLst/>
-            </a:pPr>
-            <a:endParaRPr kumimoji="0" lang="en-GB" sz="2400" b="0" i="0" u="none" strike="noStrike" cap="none" normalizeH="0" baseline="0">
-              <a:ln>
-                <a:noFill/>
-              </a:ln>
-              <a:solidFill>
-                <a:schemeClr val="tx1"/>
-              </a:solidFill>
-              <a:effectLst/>
-              <a:latin typeface="Arial" charset="0"/>
-              <a:ea typeface="ＭＳ Ｐゴシック" pitchFamily="1" charset="-128"/>
-            </a:endParaRPr>
-          </a:p>
-        </p:txBody>
-      </p:sp>
-      <p:sp>
-        <p:nvSpPr>
           <p:cNvPr id="70" name="TextBox 69">
             <a:extLst>
               <a:ext uri="{FF2B5EF4-FFF2-40B4-BE49-F238E27FC236}">
@@ -7891,13 +6525,13 @@
           <p:nvPr>
             <p:extLst>
               <p:ext uri="{D42A27DB-BD31-4B8C-83A1-F6EECF244321}">
-                <p14:modId xmlns:p14="http://schemas.microsoft.com/office/powerpoint/2010/main" val="2325352400"/>
+                <p14:modId xmlns:p14="http://schemas.microsoft.com/office/powerpoint/2010/main" val="3704338247"/>
               </p:ext>
             </p:extLst>
           </p:nvPr>
         </p:nvGraphicFramePr>
         <p:xfrm>
-          <a:off x="3224907" y="38738773"/>
+          <a:off x="3036743" y="38847190"/>
           <a:ext cx="12748538" cy="3708817"/>
         </p:xfrm>
         <a:graphic>
@@ -8272,6 +6906,544 @@
           </a:graphicData>
         </a:graphic>
       </p:graphicFrame>
+      <p:sp>
+        <p:nvSpPr>
+          <p:cNvPr id="65" name="Rectangle: Rounded Corners 64">
+            <a:extLst>
+              <a:ext uri="{FF2B5EF4-FFF2-40B4-BE49-F238E27FC236}">
+                <a16:creationId xmlns:a16="http://schemas.microsoft.com/office/drawing/2014/main" id="{9F06C41F-D8B9-4A5D-B4DD-B5F591A1886E}"/>
+              </a:ext>
+            </a:extLst>
+          </p:cNvPr>
+          <p:cNvSpPr/>
+          <p:nvPr/>
+        </p:nvSpPr>
+        <p:spPr bwMode="auto">
+          <a:xfrm>
+            <a:off x="2665541" y="18540934"/>
+            <a:ext cx="13307902" cy="6126934"/>
+          </a:xfrm>
+          <a:prstGeom prst="roundRect">
+            <a:avLst/>
+          </a:prstGeom>
+          <a:solidFill>
+            <a:schemeClr val="bg1"/>
+          </a:solidFill>
+          <a:ln w="9525" cap="flat" cmpd="sng" algn="ctr">
+            <a:solidFill>
+              <a:srgbClr val="6C5098"/>
+            </a:solidFill>
+            <a:prstDash val="solid"/>
+            <a:round/>
+            <a:headEnd type="none" w="med" len="med"/>
+            <a:tailEnd type="none" w="med" len="med"/>
+          </a:ln>
+          <a:effectLst/>
+        </p:spPr>
+        <p:txBody>
+          <a:bodyPr vert="horz" wrap="square" lIns="91440" tIns="45720" rIns="91440" bIns="45720" numCol="1" rtlCol="0" anchor="t" anchorCtr="0" compatLnSpc="1">
+            <a:prstTxWarp prst="textNoShape">
+              <a:avLst/>
+            </a:prstTxWarp>
+          </a:bodyPr>
+          <a:lstStyle/>
+          <a:p>
+            <a:pPr marL="0" marR="0" indent="0" algn="l" defTabSz="914400" rtl="0" eaLnBrk="0" fontAlgn="base" latinLnBrk="0" hangingPunct="0">
+              <a:lnSpc>
+                <a:spcPct val="100000"/>
+              </a:lnSpc>
+              <a:spcBef>
+                <a:spcPct val="0"/>
+              </a:spcBef>
+              <a:spcAft>
+                <a:spcPct val="0"/>
+              </a:spcAft>
+              <a:buClrTx/>
+              <a:buSzTx/>
+              <a:buFontTx/>
+              <a:buNone/>
+              <a:tabLst/>
+            </a:pPr>
+            <a:endParaRPr kumimoji="0" lang="en-GB" sz="2400" b="0" i="0" u="none" strike="noStrike" cap="none" normalizeH="0" baseline="0" dirty="0">
+              <a:ln>
+                <a:noFill/>
+              </a:ln>
+              <a:solidFill>
+                <a:schemeClr val="tx1"/>
+              </a:solidFill>
+              <a:effectLst/>
+              <a:latin typeface="Arial" charset="0"/>
+              <a:ea typeface="ＭＳ Ｐゴシック" pitchFamily="1" charset="-128"/>
+            </a:endParaRPr>
+          </a:p>
+        </p:txBody>
+      </p:sp>
+      <p:sp>
+        <p:nvSpPr>
+          <p:cNvPr id="81" name="Rectangle: Rounded Corners 80">
+            <a:extLst>
+              <a:ext uri="{FF2B5EF4-FFF2-40B4-BE49-F238E27FC236}">
+                <a16:creationId xmlns:a16="http://schemas.microsoft.com/office/drawing/2014/main" id="{EDBAF128-24EF-4522-AF5E-1A10635E21C2}"/>
+              </a:ext>
+            </a:extLst>
+          </p:cNvPr>
+          <p:cNvSpPr/>
+          <p:nvPr/>
+        </p:nvSpPr>
+        <p:spPr bwMode="auto">
+          <a:xfrm>
+            <a:off x="2665540" y="24899698"/>
+            <a:ext cx="13307902" cy="6306518"/>
+          </a:xfrm>
+          <a:prstGeom prst="roundRect">
+            <a:avLst/>
+          </a:prstGeom>
+          <a:solidFill>
+            <a:schemeClr val="bg1"/>
+          </a:solidFill>
+          <a:ln w="9525" cap="flat" cmpd="sng" algn="ctr">
+            <a:solidFill>
+              <a:srgbClr val="6C5098"/>
+            </a:solidFill>
+            <a:prstDash val="solid"/>
+            <a:round/>
+            <a:headEnd type="none" w="med" len="med"/>
+            <a:tailEnd type="none" w="med" len="med"/>
+          </a:ln>
+          <a:effectLst/>
+        </p:spPr>
+        <p:txBody>
+          <a:bodyPr vert="horz" wrap="square" lIns="91440" tIns="45720" rIns="91440" bIns="45720" numCol="1" rtlCol="0" anchor="t" anchorCtr="0" compatLnSpc="1">
+            <a:prstTxWarp prst="textNoShape">
+              <a:avLst/>
+            </a:prstTxWarp>
+          </a:bodyPr>
+          <a:lstStyle/>
+          <a:p>
+            <a:pPr marL="0" marR="0" indent="0" algn="l" defTabSz="914400" rtl="0" eaLnBrk="0" fontAlgn="base" latinLnBrk="0" hangingPunct="0">
+              <a:lnSpc>
+                <a:spcPct val="100000"/>
+              </a:lnSpc>
+              <a:spcBef>
+                <a:spcPct val="0"/>
+              </a:spcBef>
+              <a:spcAft>
+                <a:spcPct val="0"/>
+              </a:spcAft>
+              <a:buClrTx/>
+              <a:buSzTx/>
+              <a:buFontTx/>
+              <a:buNone/>
+              <a:tabLst/>
+            </a:pPr>
+            <a:endParaRPr kumimoji="0" lang="en-GB" sz="2400" b="0" i="0" u="none" strike="noStrike" cap="none" normalizeH="0" baseline="0" dirty="0">
+              <a:ln>
+                <a:noFill/>
+              </a:ln>
+              <a:solidFill>
+                <a:schemeClr val="tx1"/>
+              </a:solidFill>
+              <a:effectLst/>
+              <a:latin typeface="Arial" charset="0"/>
+              <a:ea typeface="ＭＳ Ｐゴシック" pitchFamily="1" charset="-128"/>
+            </a:endParaRPr>
+          </a:p>
+        </p:txBody>
+      </p:sp>
+      <p:sp>
+        <p:nvSpPr>
+          <p:cNvPr id="85" name="Rectangle: Rounded Corners 84">
+            <a:extLst>
+              <a:ext uri="{FF2B5EF4-FFF2-40B4-BE49-F238E27FC236}">
+                <a16:creationId xmlns:a16="http://schemas.microsoft.com/office/drawing/2014/main" id="{CB9920A1-AB77-41DC-BDEB-353470F1B378}"/>
+              </a:ext>
+            </a:extLst>
+          </p:cNvPr>
+          <p:cNvSpPr/>
+          <p:nvPr/>
+        </p:nvSpPr>
+        <p:spPr bwMode="auto">
+          <a:xfrm>
+            <a:off x="2665541" y="31386489"/>
+            <a:ext cx="13307902" cy="6308573"/>
+          </a:xfrm>
+          <a:prstGeom prst="roundRect">
+            <a:avLst/>
+          </a:prstGeom>
+          <a:solidFill>
+            <a:schemeClr val="bg1"/>
+          </a:solidFill>
+          <a:ln w="9525" cap="flat" cmpd="sng" algn="ctr">
+            <a:solidFill>
+              <a:srgbClr val="6C5098"/>
+            </a:solidFill>
+            <a:prstDash val="solid"/>
+            <a:round/>
+            <a:headEnd type="none" w="med" len="med"/>
+            <a:tailEnd type="none" w="med" len="med"/>
+          </a:ln>
+          <a:effectLst/>
+        </p:spPr>
+        <p:txBody>
+          <a:bodyPr vert="horz" wrap="square" lIns="91440" tIns="45720" rIns="91440" bIns="45720" numCol="1" rtlCol="0" anchor="t" anchorCtr="0" compatLnSpc="1">
+            <a:prstTxWarp prst="textNoShape">
+              <a:avLst/>
+            </a:prstTxWarp>
+          </a:bodyPr>
+          <a:lstStyle/>
+          <a:p>
+            <a:pPr marL="0" marR="0" indent="0" algn="l" defTabSz="914400" rtl="0" eaLnBrk="0" fontAlgn="base" latinLnBrk="0" hangingPunct="0">
+              <a:lnSpc>
+                <a:spcPct val="100000"/>
+              </a:lnSpc>
+              <a:spcBef>
+                <a:spcPct val="0"/>
+              </a:spcBef>
+              <a:spcAft>
+                <a:spcPct val="0"/>
+              </a:spcAft>
+              <a:buClrTx/>
+              <a:buSzTx/>
+              <a:buFontTx/>
+              <a:buNone/>
+              <a:tabLst/>
+            </a:pPr>
+            <a:endParaRPr kumimoji="0" lang="en-GB" sz="2400" b="0" i="0" u="none" strike="noStrike" cap="none" normalizeH="0" baseline="0" dirty="0">
+              <a:ln>
+                <a:noFill/>
+              </a:ln>
+              <a:solidFill>
+                <a:schemeClr val="tx1"/>
+              </a:solidFill>
+              <a:effectLst/>
+              <a:latin typeface="Arial" charset="0"/>
+              <a:ea typeface="ＭＳ Ｐゴシック" pitchFamily="1" charset="-128"/>
+            </a:endParaRPr>
+          </a:p>
+        </p:txBody>
+      </p:sp>
+      <p:sp>
+        <p:nvSpPr>
+          <p:cNvPr id="86" name="Rectangle: Rounded Corners 85">
+            <a:extLst>
+              <a:ext uri="{FF2B5EF4-FFF2-40B4-BE49-F238E27FC236}">
+                <a16:creationId xmlns:a16="http://schemas.microsoft.com/office/drawing/2014/main" id="{DDEB4AE3-A6D2-4998-AD89-CE08D3DF690E}"/>
+              </a:ext>
+            </a:extLst>
+          </p:cNvPr>
+          <p:cNvSpPr/>
+          <p:nvPr/>
+        </p:nvSpPr>
+        <p:spPr bwMode="auto">
+          <a:xfrm>
+            <a:off x="18214833" y="30228417"/>
+            <a:ext cx="13307903" cy="10116308"/>
+          </a:xfrm>
+          <a:prstGeom prst="roundRect">
+            <a:avLst/>
+          </a:prstGeom>
+          <a:solidFill>
+            <a:schemeClr val="bg1"/>
+          </a:solidFill>
+          <a:ln w="9525" cap="flat" cmpd="sng" algn="ctr">
+            <a:solidFill>
+              <a:srgbClr val="6C5098"/>
+            </a:solidFill>
+            <a:prstDash val="solid"/>
+            <a:round/>
+            <a:headEnd type="none" w="med" len="med"/>
+            <a:tailEnd type="none" w="med" len="med"/>
+          </a:ln>
+          <a:effectLst/>
+        </p:spPr>
+        <p:txBody>
+          <a:bodyPr vert="horz" wrap="square" lIns="91440" tIns="45720" rIns="91440" bIns="45720" numCol="1" rtlCol="0" anchor="t" anchorCtr="0" compatLnSpc="1">
+            <a:prstTxWarp prst="textNoShape">
+              <a:avLst/>
+            </a:prstTxWarp>
+          </a:bodyPr>
+          <a:lstStyle/>
+          <a:p>
+            <a:pPr marL="0" marR="0" indent="0" algn="l" defTabSz="914400" rtl="0" eaLnBrk="0" fontAlgn="base" latinLnBrk="0" hangingPunct="0">
+              <a:lnSpc>
+                <a:spcPct val="100000"/>
+              </a:lnSpc>
+              <a:spcBef>
+                <a:spcPct val="0"/>
+              </a:spcBef>
+              <a:spcAft>
+                <a:spcPct val="0"/>
+              </a:spcAft>
+              <a:buClrTx/>
+              <a:buSzTx/>
+              <a:buFontTx/>
+              <a:buNone/>
+              <a:tabLst/>
+            </a:pPr>
+            <a:endParaRPr kumimoji="0" lang="en-GB" sz="2400" b="0" i="0" u="none" strike="noStrike" cap="none" normalizeH="0" baseline="0" dirty="0">
+              <a:ln>
+                <a:noFill/>
+              </a:ln>
+              <a:solidFill>
+                <a:schemeClr val="tx1"/>
+              </a:solidFill>
+              <a:effectLst/>
+              <a:latin typeface="Arial" charset="0"/>
+              <a:ea typeface="ＭＳ Ｐゴシック" pitchFamily="1" charset="-128"/>
+            </a:endParaRPr>
+          </a:p>
+        </p:txBody>
+      </p:sp>
+      <p:pic>
+        <p:nvPicPr>
+          <p:cNvPr id="51" name="Picture 50" descr="A picture containing drawing&#10;&#10;Description automatically generated">
+            <a:extLst>
+              <a:ext uri="{FF2B5EF4-FFF2-40B4-BE49-F238E27FC236}">
+                <a16:creationId xmlns:a16="http://schemas.microsoft.com/office/drawing/2014/main" id="{EB922F53-BD98-4841-A12F-C78AB8BC1675}"/>
+              </a:ext>
+            </a:extLst>
+          </p:cNvPr>
+          <p:cNvPicPr>
+            <a:picLocks noChangeAspect="1"/>
+          </p:cNvPicPr>
+          <p:nvPr/>
+        </p:nvPicPr>
+        <p:blipFill>
+          <a:blip r:embed="rId11">
+            <a:extLst>
+              <a:ext uri="{28A0092B-C50C-407E-A947-70E740481C1C}">
+                <a14:useLocalDpi xmlns:a14="http://schemas.microsoft.com/office/drawing/2010/main" val="0"/>
+              </a:ext>
+            </a:extLst>
+          </a:blip>
+          <a:stretch>
+            <a:fillRect/>
+          </a:stretch>
+        </p:blipFill>
+        <p:spPr>
+          <a:xfrm>
+            <a:off x="4692999" y="31646390"/>
+            <a:ext cx="9436027" cy="2763408"/>
+          </a:xfrm>
+          <a:prstGeom prst="rect">
+            <a:avLst/>
+          </a:prstGeom>
+        </p:spPr>
+      </p:pic>
+      <p:pic>
+        <p:nvPicPr>
+          <p:cNvPr id="53" name="Graphic 52">
+            <a:extLst>
+              <a:ext uri="{FF2B5EF4-FFF2-40B4-BE49-F238E27FC236}">
+                <a16:creationId xmlns:a16="http://schemas.microsoft.com/office/drawing/2014/main" id="{07831D89-DC11-46AC-AD70-A90F6820CF82}"/>
+              </a:ext>
+            </a:extLst>
+          </p:cNvPr>
+          <p:cNvPicPr>
+            <a:picLocks noChangeAspect="1"/>
+          </p:cNvPicPr>
+          <p:nvPr/>
+        </p:nvPicPr>
+        <p:blipFill>
+          <a:blip r:embed="rId12">
+            <a:extLst>
+              <a:ext uri="{28A0092B-C50C-407E-A947-70E740481C1C}">
+                <a14:useLocalDpi xmlns:a14="http://schemas.microsoft.com/office/drawing/2010/main" val="0"/>
+              </a:ext>
+              <a:ext uri="{96DAC541-7B7A-43D3-8B79-37D633B846F1}">
+                <asvg:svgBlip xmlns:asvg="http://schemas.microsoft.com/office/drawing/2016/SVG/main" r:embed="rId13"/>
+              </a:ext>
+            </a:extLst>
+          </a:blip>
+          <a:stretch>
+            <a:fillRect/>
+          </a:stretch>
+        </p:blipFill>
+        <p:spPr>
+          <a:xfrm>
+            <a:off x="9834449" y="26003082"/>
+            <a:ext cx="6039162" cy="1453274"/>
+          </a:xfrm>
+          <a:prstGeom prst="rect">
+            <a:avLst/>
+          </a:prstGeom>
+        </p:spPr>
+      </p:pic>
+      <p:pic>
+        <p:nvPicPr>
+          <p:cNvPr id="7" name="Picture 6" descr="A picture containing clock&#10;&#10;Description automatically generated">
+            <a:extLst>
+              <a:ext uri="{FF2B5EF4-FFF2-40B4-BE49-F238E27FC236}">
+                <a16:creationId xmlns:a16="http://schemas.microsoft.com/office/drawing/2014/main" id="{4F4BC309-E76C-4067-B176-5E35013B0A9B}"/>
+              </a:ext>
+            </a:extLst>
+          </p:cNvPr>
+          <p:cNvPicPr>
+            <a:picLocks noChangeAspect="1"/>
+          </p:cNvPicPr>
+          <p:nvPr/>
+        </p:nvPicPr>
+        <p:blipFill rotWithShape="1">
+          <a:blip r:embed="rId14">
+            <a:extLst>
+              <a:ext uri="{28A0092B-C50C-407E-A947-70E740481C1C}">
+                <a14:useLocalDpi xmlns:a14="http://schemas.microsoft.com/office/drawing/2010/main" val="0"/>
+              </a:ext>
+            </a:extLst>
+          </a:blip>
+          <a:srcRect l="6557" t="46242" r="49457" b="6538"/>
+          <a:stretch/>
+        </p:blipFill>
+        <p:spPr>
+          <a:xfrm>
+            <a:off x="13008637" y="14683221"/>
+            <a:ext cx="2792966" cy="2251060"/>
+          </a:xfrm>
+          <a:prstGeom prst="rect">
+            <a:avLst/>
+          </a:prstGeom>
+        </p:spPr>
+      </p:pic>
+      <p:pic>
+        <p:nvPicPr>
+          <p:cNvPr id="17" name="Picture 16" descr="A picture containing remote&#10;&#10;Description automatically generated">
+            <a:extLst>
+              <a:ext uri="{FF2B5EF4-FFF2-40B4-BE49-F238E27FC236}">
+                <a16:creationId xmlns:a16="http://schemas.microsoft.com/office/drawing/2014/main" id="{FB6642AD-8A13-4C41-95A4-DA47CB163C14}"/>
+              </a:ext>
+            </a:extLst>
+          </p:cNvPr>
+          <p:cNvPicPr>
+            <a:picLocks noChangeAspect="1"/>
+          </p:cNvPicPr>
+          <p:nvPr/>
+        </p:nvPicPr>
+        <p:blipFill rotWithShape="1">
+          <a:blip r:embed="rId15">
+            <a:extLst>
+              <a:ext uri="{28A0092B-C50C-407E-A947-70E740481C1C}">
+                <a14:useLocalDpi xmlns:a14="http://schemas.microsoft.com/office/drawing/2010/main" val="0"/>
+              </a:ext>
+            </a:extLst>
+          </a:blip>
+          <a:srcRect l="24945" t="-297" r="41723" b="59968"/>
+          <a:stretch/>
+        </p:blipFill>
+        <p:spPr>
+          <a:xfrm>
+            <a:off x="3257098" y="18703070"/>
+            <a:ext cx="2516481" cy="2664046"/>
+          </a:xfrm>
+          <a:prstGeom prst="rect">
+            <a:avLst/>
+          </a:prstGeom>
+        </p:spPr>
+      </p:pic>
+      <p:pic>
+        <p:nvPicPr>
+          <p:cNvPr id="20" name="Picture 19" descr="A close up of a logo&#10;&#10;Description automatically generated">
+            <a:extLst>
+              <a:ext uri="{FF2B5EF4-FFF2-40B4-BE49-F238E27FC236}">
+                <a16:creationId xmlns:a16="http://schemas.microsoft.com/office/drawing/2014/main" id="{DD7996B2-49F6-4FCF-B8F0-3CE96A24B5FF}"/>
+              </a:ext>
+            </a:extLst>
+          </p:cNvPr>
+          <p:cNvPicPr>
+            <a:picLocks noChangeAspect="1"/>
+          </p:cNvPicPr>
+          <p:nvPr/>
+        </p:nvPicPr>
+        <p:blipFill rotWithShape="1">
+          <a:blip r:embed="rId16">
+            <a:extLst>
+              <a:ext uri="{28A0092B-C50C-407E-A947-70E740481C1C}">
+                <a14:useLocalDpi xmlns:a14="http://schemas.microsoft.com/office/drawing/2010/main" val="0"/>
+              </a:ext>
+            </a:extLst>
+          </a:blip>
+          <a:srcRect l="9377" t="18273" r="55882" b="63739"/>
+          <a:stretch/>
+        </p:blipFill>
+        <p:spPr>
+          <a:xfrm>
+            <a:off x="8115477" y="14554456"/>
+            <a:ext cx="3104789" cy="1354218"/>
+          </a:xfrm>
+          <a:prstGeom prst="rect">
+            <a:avLst/>
+          </a:prstGeom>
+        </p:spPr>
+      </p:pic>
+      <p:pic>
+        <p:nvPicPr>
+          <p:cNvPr id="32" name="Picture 31" descr="A picture containing drawing&#10;&#10;Description automatically generated">
+            <a:extLst>
+              <a:ext uri="{FF2B5EF4-FFF2-40B4-BE49-F238E27FC236}">
+                <a16:creationId xmlns:a16="http://schemas.microsoft.com/office/drawing/2014/main" id="{DF71E793-94AD-456F-BE1A-E517AEF82F4A}"/>
+              </a:ext>
+            </a:extLst>
+          </p:cNvPr>
+          <p:cNvPicPr>
+            <a:picLocks noChangeAspect="1"/>
+          </p:cNvPicPr>
+          <p:nvPr/>
+        </p:nvPicPr>
+        <p:blipFill rotWithShape="1">
+          <a:blip r:embed="rId17">
+            <a:extLst>
+              <a:ext uri="{28A0092B-C50C-407E-A947-70E740481C1C}">
+                <a14:useLocalDpi xmlns:a14="http://schemas.microsoft.com/office/drawing/2010/main" val="0"/>
+              </a:ext>
+            </a:extLst>
+          </a:blip>
+          <a:srcRect l="2426" t="78993" r="75470" b="7673"/>
+          <a:stretch/>
+        </p:blipFill>
+        <p:spPr>
+          <a:xfrm>
+            <a:off x="12777267" y="18747581"/>
+            <a:ext cx="3024336" cy="2529370"/>
+          </a:xfrm>
+          <a:prstGeom prst="snipRoundRect">
+            <a:avLst/>
+          </a:prstGeom>
+        </p:spPr>
+      </p:pic>
+      <p:pic>
+        <p:nvPicPr>
+          <p:cNvPr id="34" name="Picture 33" descr="A close up of a logo&#10;&#10;Description automatically generated">
+            <a:extLst>
+              <a:ext uri="{FF2B5EF4-FFF2-40B4-BE49-F238E27FC236}">
+                <a16:creationId xmlns:a16="http://schemas.microsoft.com/office/drawing/2014/main" id="{EED5F03A-6C47-4377-9022-611ED9490030}"/>
+              </a:ext>
+            </a:extLst>
+          </p:cNvPr>
+          <p:cNvPicPr>
+            <a:picLocks noChangeAspect="1"/>
+          </p:cNvPicPr>
+          <p:nvPr/>
+        </p:nvPicPr>
+        <p:blipFill rotWithShape="1">
+          <a:blip r:embed="rId18">
+            <a:extLst>
+              <a:ext uri="{28A0092B-C50C-407E-A947-70E740481C1C}">
+                <a14:useLocalDpi xmlns:a14="http://schemas.microsoft.com/office/drawing/2010/main" val="0"/>
+              </a:ext>
+            </a:extLst>
+          </a:blip>
+          <a:srcRect l="463" t="45343" r="73765" b="31712"/>
+          <a:stretch/>
+        </p:blipFill>
+        <p:spPr>
+          <a:xfrm>
+            <a:off x="7865507" y="18661167"/>
+            <a:ext cx="2792127" cy="2066252"/>
+          </a:xfrm>
+          <a:prstGeom prst="rect">
+            <a:avLst/>
+          </a:prstGeom>
+        </p:spPr>
+      </p:pic>
       <p:pic>
         <p:nvPicPr>
           <p:cNvPr id="74" name="Picture 73" descr="A picture containing table, indoor, sitting, cake&#10;&#10;Description automatically generated">
@@ -8287,7 +7459,7 @@
           <p:nvPr/>
         </p:nvPicPr>
         <p:blipFill>
-          <a:blip r:embed="rId21">
+          <a:blip r:embed="rId19">
             <a:extLst>
               <a:ext uri="{28A0092B-C50C-407E-A947-70E740481C1C}">
                 <a14:useLocalDpi xmlns:a14="http://schemas.microsoft.com/office/drawing/2010/main" val="0"/>
@@ -8318,6 +7490,197 @@
           </a:effectLst>
         </p:spPr>
       </p:pic>
+      <p:pic>
+        <p:nvPicPr>
+          <p:cNvPr id="83" name="Picture 2">
+            <a:extLst>
+              <a:ext uri="{FF2B5EF4-FFF2-40B4-BE49-F238E27FC236}">
+                <a16:creationId xmlns:a16="http://schemas.microsoft.com/office/drawing/2014/main" id="{F715BA96-317E-43E2-B0D9-7D61684619E5}"/>
+              </a:ext>
+            </a:extLst>
+          </p:cNvPr>
+          <p:cNvPicPr>
+            <a:picLocks noChangeAspect="1" noChangeArrowheads="1"/>
+          </p:cNvPicPr>
+          <p:nvPr/>
+        </p:nvPicPr>
+        <p:blipFill>
+          <a:blip r:embed="rId20">
+            <a:extLst>
+              <a:ext uri="{28A0092B-C50C-407E-A947-70E740481C1C}">
+                <a14:useLocalDpi xmlns:a14="http://schemas.microsoft.com/office/drawing/2010/main" val="0"/>
+              </a:ext>
+            </a:extLst>
+          </a:blip>
+          <a:srcRect/>
+          <a:stretch>
+            <a:fillRect/>
+          </a:stretch>
+        </p:blipFill>
+        <p:spPr bwMode="auto">
+          <a:xfrm>
+            <a:off x="3248999" y="25165670"/>
+            <a:ext cx="6490497" cy="2994985"/>
+          </a:xfrm>
+          <a:prstGeom prst="rect">
+            <a:avLst/>
+          </a:prstGeom>
+          <a:noFill/>
+          <a:extLst>
+            <a:ext uri="{909E8E84-426E-40DD-AFC4-6F175D3DCCD1}">
+              <a14:hiddenFill xmlns:a14="http://schemas.microsoft.com/office/drawing/2010/main">
+                <a:solidFill>
+                  <a:srgbClr val="FFFFFF"/>
+                </a:solidFill>
+              </a14:hiddenFill>
+            </a:ext>
+          </a:extLst>
+        </p:spPr>
+      </p:pic>
+      <p:sp>
+        <p:nvSpPr>
+          <p:cNvPr id="67" name="Arrow: Right 66">
+            <a:extLst>
+              <a:ext uri="{FF2B5EF4-FFF2-40B4-BE49-F238E27FC236}">
+                <a16:creationId xmlns:a16="http://schemas.microsoft.com/office/drawing/2014/main" id="{B7BF118F-202B-4A08-83A9-E3734815C270}"/>
+              </a:ext>
+            </a:extLst>
+          </p:cNvPr>
+          <p:cNvSpPr/>
+          <p:nvPr/>
+        </p:nvSpPr>
+        <p:spPr bwMode="auto">
+          <a:xfrm rot="20445938">
+            <a:off x="5884795" y="19521320"/>
+            <a:ext cx="1755918" cy="592460"/>
+          </a:xfrm>
+          <a:prstGeom prst="rightArrow">
+            <a:avLst/>
+          </a:prstGeom>
+          <a:solidFill>
+            <a:srgbClr val="6C5098"/>
+          </a:solidFill>
+          <a:ln w="9525" cap="flat" cmpd="sng" algn="ctr">
+            <a:solidFill>
+              <a:schemeClr val="tx1"/>
+            </a:solidFill>
+            <a:prstDash val="solid"/>
+            <a:round/>
+            <a:headEnd type="none" w="med" len="med"/>
+            <a:tailEnd type="none" w="med" len="med"/>
+          </a:ln>
+          <a:effectLst/>
+        </p:spPr>
+        <p:txBody>
+          <a:bodyPr vert="horz" wrap="square" lIns="91440" tIns="45720" rIns="91440" bIns="45720" numCol="1" rtlCol="0" anchor="t" anchorCtr="0" compatLnSpc="1">
+            <a:prstTxWarp prst="textNoShape">
+              <a:avLst/>
+            </a:prstTxWarp>
+          </a:bodyPr>
+          <a:lstStyle/>
+          <a:p>
+            <a:pPr marL="0" marR="0" indent="0" algn="l" defTabSz="914400" rtl="0" eaLnBrk="0" fontAlgn="base" latinLnBrk="0" hangingPunct="0">
+              <a:lnSpc>
+                <a:spcPct val="100000"/>
+              </a:lnSpc>
+              <a:spcBef>
+                <a:spcPct val="0"/>
+              </a:spcBef>
+              <a:spcAft>
+                <a:spcPct val="0"/>
+              </a:spcAft>
+              <a:buClrTx/>
+              <a:buSzTx/>
+              <a:buFontTx/>
+              <a:buNone/>
+              <a:tabLst/>
+            </a:pPr>
+            <a:endParaRPr kumimoji="0" lang="en-GB" sz="2400" b="0" i="0" u="none" strike="noStrike" cap="none" normalizeH="0" baseline="0">
+              <a:ln>
+                <a:noFill/>
+              </a:ln>
+              <a:solidFill>
+                <a:schemeClr val="tx1"/>
+              </a:solidFill>
+              <a:effectLst/>
+              <a:latin typeface="Arial" charset="0"/>
+              <a:ea typeface="ＭＳ Ｐゴシック" pitchFamily="1" charset="-128"/>
+            </a:endParaRPr>
+          </a:p>
+        </p:txBody>
+      </p:sp>
+      <p:sp>
+        <p:nvSpPr>
+          <p:cNvPr id="69" name="Arrow: Right 68">
+            <a:extLst>
+              <a:ext uri="{FF2B5EF4-FFF2-40B4-BE49-F238E27FC236}">
+                <a16:creationId xmlns:a16="http://schemas.microsoft.com/office/drawing/2014/main" id="{A66D563B-1809-4BC9-A4B4-4B2173DC54BD}"/>
+              </a:ext>
+            </a:extLst>
+          </p:cNvPr>
+          <p:cNvSpPr/>
+          <p:nvPr/>
+        </p:nvSpPr>
+        <p:spPr bwMode="auto">
+          <a:xfrm rot="700766">
+            <a:off x="11023732" y="19579155"/>
+            <a:ext cx="1755918" cy="592460"/>
+          </a:xfrm>
+          <a:prstGeom prst="rightArrow">
+            <a:avLst/>
+          </a:prstGeom>
+          <a:solidFill>
+            <a:srgbClr val="6C5098"/>
+          </a:solidFill>
+          <a:ln w="9525" cap="flat" cmpd="sng" algn="ctr">
+            <a:solidFill>
+              <a:schemeClr val="tx1"/>
+            </a:solidFill>
+            <a:prstDash val="solid"/>
+            <a:round/>
+            <a:headEnd type="none" w="med" len="med"/>
+            <a:tailEnd type="none" w="med" len="med"/>
+          </a:ln>
+          <a:effectLst/>
+        </p:spPr>
+        <p:txBody>
+          <a:bodyPr vert="horz" wrap="square" lIns="91440" tIns="45720" rIns="91440" bIns="45720" numCol="1" rtlCol="0" anchor="t" anchorCtr="0" compatLnSpc="1">
+            <a:prstTxWarp prst="textNoShape">
+              <a:avLst/>
+            </a:prstTxWarp>
+          </a:bodyPr>
+          <a:lstStyle/>
+          <a:p>
+            <a:pPr marL="0" marR="0" indent="0" algn="l" defTabSz="914400" rtl="0" eaLnBrk="0" fontAlgn="base" latinLnBrk="0" hangingPunct="0">
+              <a:lnSpc>
+                <a:spcPct val="100000"/>
+              </a:lnSpc>
+              <a:spcBef>
+                <a:spcPct val="0"/>
+              </a:spcBef>
+              <a:spcAft>
+                <a:spcPct val="0"/>
+              </a:spcAft>
+              <a:buClrTx/>
+              <a:buSzTx/>
+              <a:buFontTx/>
+              <a:buNone/>
+              <a:tabLst/>
+            </a:pPr>
+            <a:endParaRPr kumimoji="0" lang="en-GB" sz="2400" b="0" i="0" u="none" strike="noStrike" cap="none" normalizeH="0" baseline="0">
+              <a:ln>
+                <a:noFill/>
+              </a:ln>
+              <a:solidFill>
+                <a:schemeClr val="tx1"/>
+              </a:solidFill>
+              <a:effectLst/>
+              <a:latin typeface="Arial" charset="0"/>
+              <a:ea typeface="ＭＳ Ｐゴシック" pitchFamily="1" charset="-128"/>
+            </a:endParaRPr>
+          </a:p>
+        </p:txBody>
+      </p:sp>
       <p:graphicFrame>
         <p:nvGraphicFramePr>
           <p:cNvPr id="77" name="Table 18">
@@ -8333,7 +7696,7 @@
           <p:nvPr>
             <p:extLst>
               <p:ext uri="{D42A27DB-BD31-4B8C-83A1-F6EECF244321}">
-                <p14:modId xmlns:p14="http://schemas.microsoft.com/office/powerpoint/2010/main" val="4202030430"/>
+                <p14:modId xmlns:p14="http://schemas.microsoft.com/office/powerpoint/2010/main" val="3303295011"/>
               </p:ext>
             </p:extLst>
           </p:nvPr>
@@ -8405,6 +7768,26 @@
                     </a:p>
                   </a:txBody>
                   <a:tcPr>
+                    <a:lnL w="12700" cmpd="sng">
+                      <a:noFill/>
+                    </a:lnL>
+                    <a:lnR w="12700" cmpd="sng">
+                      <a:noFill/>
+                    </a:lnR>
+                    <a:lnT w="12700" cmpd="sng">
+                      <a:noFill/>
+                    </a:lnT>
+                    <a:lnB w="38100" cmpd="sng">
+                      <a:noFill/>
+                    </a:lnB>
+                    <a:lnTlToBr w="12700" cmpd="sng">
+                      <a:noFill/>
+                      <a:prstDash val="solid"/>
+                    </a:lnTlToBr>
+                    <a:lnBlToTr w="12700" cmpd="sng">
+                      <a:noFill/>
+                      <a:prstDash val="solid"/>
+                    </a:lnBlToTr>
                     <a:noFill/>
                   </a:tcPr>
                 </a:tc>
@@ -8539,6 +7922,26 @@
                     </a:p>
                   </a:txBody>
                   <a:tcPr>
+                    <a:lnL w="12700" cmpd="sng">
+                      <a:noFill/>
+                    </a:lnL>
+                    <a:lnR w="12700" cmpd="sng">
+                      <a:noFill/>
+                    </a:lnR>
+                    <a:lnT w="38100" cmpd="sng">
+                      <a:noFill/>
+                    </a:lnT>
+                    <a:lnB w="12700" cmpd="sng">
+                      <a:noFill/>
+                    </a:lnB>
+                    <a:lnTlToBr w="12700" cmpd="sng">
+                      <a:noFill/>
+                      <a:prstDash val="solid"/>
+                    </a:lnTlToBr>
+                    <a:lnBlToTr w="12700" cmpd="sng">
+                      <a:noFill/>
+                      <a:prstDash val="solid"/>
+                    </a:lnBlToTr>
                     <a:noFill/>
                   </a:tcPr>
                 </a:tc>
@@ -8652,6 +8055,26 @@
                     </a:p>
                   </a:txBody>
                   <a:tcPr>
+                    <a:lnL w="12700" cmpd="sng">
+                      <a:noFill/>
+                    </a:lnL>
+                    <a:lnR w="12700" cmpd="sng">
+                      <a:noFill/>
+                    </a:lnR>
+                    <a:lnT w="38100" cmpd="sng">
+                      <a:noFill/>
+                    </a:lnT>
+                    <a:lnB w="12700" cmpd="sng">
+                      <a:noFill/>
+                    </a:lnB>
+                    <a:lnTlToBr w="12700" cmpd="sng">
+                      <a:noFill/>
+                      <a:prstDash val="solid"/>
+                    </a:lnTlToBr>
+                    <a:lnBlToTr w="12700" cmpd="sng">
+                      <a:noFill/>
+                      <a:prstDash val="solid"/>
+                    </a:lnBlToTr>
                     <a:noFill/>
                   </a:tcPr>
                 </a:tc>
@@ -8734,6 +8157,26 @@
                     </a:p>
                   </a:txBody>
                   <a:tcPr>
+                    <a:lnL w="12700" cmpd="sng">
+                      <a:noFill/>
+                    </a:lnL>
+                    <a:lnR w="12700" cmpd="sng">
+                      <a:noFill/>
+                    </a:lnR>
+                    <a:lnT w="38100" cmpd="sng">
+                      <a:noFill/>
+                    </a:lnT>
+                    <a:lnB w="12700" cmpd="sng">
+                      <a:noFill/>
+                    </a:lnB>
+                    <a:lnTlToBr w="12700" cmpd="sng">
+                      <a:noFill/>
+                      <a:prstDash val="solid"/>
+                    </a:lnTlToBr>
+                    <a:lnBlToTr w="12700" cmpd="sng">
+                      <a:noFill/>
+                      <a:prstDash val="solid"/>
+                    </a:lnBlToTr>
                     <a:noFill/>
                   </a:tcPr>
                 </a:tc>
@@ -8749,85 +8192,1064 @@
       </p:graphicFrame>
       <p:sp>
         <p:nvSpPr>
-          <p:cNvPr id="65" name="Rectangle: Rounded Corners 64">
+          <p:cNvPr id="78" name="TextBox 77">
             <a:extLst>
               <a:ext uri="{FF2B5EF4-FFF2-40B4-BE49-F238E27FC236}">
-                <a16:creationId xmlns:a16="http://schemas.microsoft.com/office/drawing/2014/main" id="{9F06C41F-D8B9-4A5D-B4DD-B5F591A1886E}"/>
+                <a16:creationId xmlns:a16="http://schemas.microsoft.com/office/drawing/2014/main" id="{D87A0A6C-6B54-437E-9926-C97DE0DC85E1}"/>
+              </a:ext>
+            </a:extLst>
+          </p:cNvPr>
+          <p:cNvSpPr txBox="1"/>
+          <p:nvPr/>
+        </p:nvSpPr>
+        <p:spPr>
+          <a:xfrm>
+            <a:off x="2757063" y="28190006"/>
+            <a:ext cx="13307903" cy="3016210"/>
+          </a:xfrm>
+          <a:prstGeom prst="rect">
+            <a:avLst/>
+          </a:prstGeom>
+          <a:noFill/>
+        </p:spPr>
+        <p:txBody>
+          <a:bodyPr wrap="square" rtlCol="0">
+            <a:spAutoFit/>
+          </a:bodyPr>
+          <a:lstStyle/>
+          <a:p>
+            <a:pPr algn="ctr"/>
+            <a:r>
+              <a:rPr lang="en-US" sz="3800" b="1" dirty="0">
+                <a:solidFill>
+                  <a:srgbClr val="6C5098"/>
+                </a:solidFill>
+              </a:rPr>
+              <a:t>Radial basis function (RBF)</a:t>
+            </a:r>
+            <a:endParaRPr lang="en-GB" sz="3800" b="1" dirty="0">
+              <a:solidFill>
+                <a:srgbClr val="6C5098"/>
+              </a:solidFill>
+            </a:endParaRPr>
+          </a:p>
+          <a:p>
+            <a:pPr algn="ctr"/>
+            <a:r>
+              <a:rPr lang="fr-FR" sz="3800" dirty="0"/>
+              <a:t>est une fonction noyau de transformation permettant de trouver l’hyperplan séparateur adéquat en calculant plus efficacement les produits scalaires des projections des données.</a:t>
+            </a:r>
+          </a:p>
+        </p:txBody>
+      </p:sp>
+      <p:sp>
+        <p:nvSpPr>
+          <p:cNvPr id="79" name="TextBox 78">
+            <a:extLst>
+              <a:ext uri="{FF2B5EF4-FFF2-40B4-BE49-F238E27FC236}">
+                <a16:creationId xmlns:a16="http://schemas.microsoft.com/office/drawing/2014/main" id="{1D36B01D-440B-454A-B4F7-9AE59D7116E8}"/>
+              </a:ext>
+            </a:extLst>
+          </p:cNvPr>
+          <p:cNvSpPr txBox="1"/>
+          <p:nvPr/>
+        </p:nvSpPr>
+        <p:spPr>
+          <a:xfrm>
+            <a:off x="2792935" y="34526710"/>
+            <a:ext cx="13307903" cy="3016210"/>
+          </a:xfrm>
+          <a:prstGeom prst="rect">
+            <a:avLst/>
+          </a:prstGeom>
+          <a:noFill/>
+        </p:spPr>
+        <p:txBody>
+          <a:bodyPr wrap="square" rtlCol="0">
+            <a:spAutoFit/>
+          </a:bodyPr>
+          <a:lstStyle/>
+          <a:p>
+            <a:pPr algn="ctr"/>
+            <a:r>
+              <a:rPr lang="fr-FR" sz="3800" b="1" dirty="0">
+                <a:solidFill>
+                  <a:srgbClr val="6C5098"/>
+                </a:solidFill>
+              </a:rPr>
+              <a:t>One vs One</a:t>
+            </a:r>
+          </a:p>
+          <a:p>
+            <a:pPr algn="ctr"/>
+            <a:r>
+              <a:rPr lang="fr-FR" sz="3800" dirty="0"/>
+              <a:t>K (K - 1) / 2 classificateurs binaires sont créés. Au moment de la prédiction, un système de vote est appliqué, la classe qui a obtenu le plus grand nombre de prédictions est prédite par le classificateur combiné.</a:t>
+            </a:r>
+          </a:p>
+        </p:txBody>
+      </p:sp>
+      <p:pic>
+        <p:nvPicPr>
+          <p:cNvPr id="5" name="Picture 4" descr="A picture containing map, text&#10;&#10;Description automatically generated">
+            <a:extLst>
+              <a:ext uri="{FF2B5EF4-FFF2-40B4-BE49-F238E27FC236}">
+                <a16:creationId xmlns:a16="http://schemas.microsoft.com/office/drawing/2014/main" id="{62400BA3-48D7-4269-9F0D-EC4FD71B23C6}"/>
+              </a:ext>
+            </a:extLst>
+          </p:cNvPr>
+          <p:cNvPicPr>
+            <a:picLocks noChangeAspect="1"/>
+          </p:cNvPicPr>
+          <p:nvPr/>
+        </p:nvPicPr>
+        <p:blipFill>
+          <a:blip r:embed="rId21">
+            <a:extLst>
+              <a:ext uri="{28A0092B-C50C-407E-A947-70E740481C1C}">
+                <a14:useLocalDpi xmlns:a14="http://schemas.microsoft.com/office/drawing/2010/main" val="0"/>
+              </a:ext>
+            </a:extLst>
+          </a:blip>
+          <a:stretch>
+            <a:fillRect/>
+          </a:stretch>
+        </p:blipFill>
+        <p:spPr>
+          <a:xfrm>
+            <a:off x="18166610" y="14385802"/>
+            <a:ext cx="13185693" cy="3867099"/>
+          </a:xfrm>
+          <a:prstGeom prst="roundRect">
+            <a:avLst>
+              <a:gd name="adj" fmla="val 16667"/>
+            </a:avLst>
+          </a:prstGeom>
+          <a:ln>
+            <a:solidFill>
+              <a:srgbClr val="6C5098"/>
+            </a:solidFill>
+          </a:ln>
+          <a:effectLst>
+            <a:outerShdw blurRad="76200" dist="38100" dir="7800000" algn="tl" rotWithShape="0">
+              <a:srgbClr val="000000">
+                <a:alpha val="40000"/>
+              </a:srgbClr>
+            </a:outerShdw>
+          </a:effectLst>
+          <a:scene3d>
+            <a:camera prst="orthographicFront"/>
+            <a:lightRig rig="contrasting" dir="t">
+              <a:rot lat="0" lon="0" rev="4200000"/>
+            </a:lightRig>
+          </a:scene3d>
+          <a:sp3d prstMaterial="plastic">
+            <a:bevelT w="381000" h="114300" prst="relaxedInset"/>
+            <a:contourClr>
+              <a:srgbClr val="969696"/>
+            </a:contourClr>
+          </a:sp3d>
+        </p:spPr>
+      </p:pic>
+      <p:sp>
+        <p:nvSpPr>
+          <p:cNvPr id="12" name="Rectangle 11">
+            <a:extLst>
+              <a:ext uri="{FF2B5EF4-FFF2-40B4-BE49-F238E27FC236}">
+                <a16:creationId xmlns:a16="http://schemas.microsoft.com/office/drawing/2014/main" id="{29B13DE1-B03F-49D8-80FA-892FABC9A966}"/>
               </a:ext>
             </a:extLst>
           </p:cNvPr>
           <p:cNvSpPr/>
           <p:nvPr/>
         </p:nvSpPr>
-        <p:spPr bwMode="auto">
+        <p:spPr>
           <a:xfrm>
-            <a:off x="2665541" y="18540934"/>
-            <a:ext cx="13307902" cy="6126934"/>
+            <a:off x="23617348" y="13104448"/>
+            <a:ext cx="2406428" cy="1323439"/>
           </a:xfrm>
-          <a:prstGeom prst="roundRect">
+          <a:prstGeom prst="rect">
             <a:avLst/>
           </a:prstGeom>
           <a:noFill/>
-          <a:ln w="9525" cap="flat" cmpd="sng" algn="ctr">
-            <a:solidFill>
-              <a:srgbClr val="6C5098"/>
-            </a:solidFill>
-            <a:prstDash val="solid"/>
-            <a:round/>
-            <a:headEnd type="none" w="med" len="med"/>
-            <a:tailEnd type="none" w="med" len="med"/>
-          </a:ln>
-          <a:effectLst/>
         </p:spPr>
         <p:txBody>
-          <a:bodyPr vert="horz" wrap="square" lIns="91440" tIns="45720" rIns="91440" bIns="45720" numCol="1" rtlCol="0" anchor="t" anchorCtr="0" compatLnSpc="1">
-            <a:prstTxWarp prst="textNoShape">
-              <a:avLst/>
-            </a:prstTxWarp>
+          <a:bodyPr wrap="none" lIns="91440" tIns="45720" rIns="91440" bIns="45720">
+            <a:spAutoFit/>
           </a:bodyPr>
           <a:lstStyle/>
           <a:p>
-            <a:pPr marL="0" marR="0" indent="0" algn="l" defTabSz="914400" rtl="0" eaLnBrk="0" fontAlgn="base" latinLnBrk="0" hangingPunct="0">
-              <a:lnSpc>
-                <a:spcPct val="100000"/>
-              </a:lnSpc>
-              <a:spcBef>
-                <a:spcPct val="0"/>
-              </a:spcBef>
-              <a:spcAft>
-                <a:spcPct val="0"/>
-              </a:spcAft>
-              <a:buClrTx/>
-              <a:buSzTx/>
-              <a:buFontTx/>
-              <a:buNone/>
-              <a:tabLst/>
-            </a:pPr>
-            <a:endParaRPr kumimoji="0" lang="en-GB" sz="2400" b="0" i="0" u="none" strike="noStrike" cap="none" normalizeH="0" baseline="0" dirty="0">
-              <a:ln>
-                <a:noFill/>
+            <a:pPr algn="ctr"/>
+            <a:r>
+              <a:rPr lang="en-US" sz="8000" b="1" dirty="0">
+                <a:ln w="22225">
+                  <a:solidFill>
+                    <a:schemeClr val="accent2"/>
+                  </a:solidFill>
+                  <a:prstDash val="solid"/>
+                </a:ln>
+                <a:solidFill>
+                  <a:schemeClr val="accent2">
+                    <a:lumMod val="60000"/>
+                    <a:lumOff val="40000"/>
+                  </a:schemeClr>
+                </a:solidFill>
+              </a:rPr>
+              <a:t>CNN</a:t>
+            </a:r>
+            <a:endParaRPr lang="en-US" sz="8000" b="1" cap="none" spc="0" dirty="0">
+              <a:ln w="22225">
+                <a:solidFill>
+                  <a:schemeClr val="accent2"/>
+                </a:solidFill>
+                <a:prstDash val="solid"/>
               </a:ln>
               <a:solidFill>
-                <a:schemeClr val="tx1"/>
+                <a:schemeClr val="accent2">
+                  <a:lumMod val="60000"/>
+                  <a:lumOff val="40000"/>
+                </a:schemeClr>
               </a:solidFill>
               <a:effectLst/>
-              <a:latin typeface="Arial" charset="0"/>
-              <a:ea typeface="ＭＳ Ｐゴシック" pitchFamily="1" charset="-128"/>
             </a:endParaRPr>
           </a:p>
         </p:txBody>
       </p:sp>
+      <p:graphicFrame>
+        <p:nvGraphicFramePr>
+          <p:cNvPr id="11" name="Table 18">
+            <a:extLst>
+              <a:ext uri="{FF2B5EF4-FFF2-40B4-BE49-F238E27FC236}">
+                <a16:creationId xmlns:a16="http://schemas.microsoft.com/office/drawing/2014/main" id="{BCBAF032-1143-44B8-8A28-B9DB00CA3586}"/>
+              </a:ext>
+            </a:extLst>
+          </p:cNvPr>
+          <p:cNvGraphicFramePr>
+            <a:graphicFrameLocks noGrp="1"/>
+          </p:cNvGraphicFramePr>
+          <p:nvPr>
+            <p:extLst>
+              <p:ext uri="{D42A27DB-BD31-4B8C-83A1-F6EECF244321}">
+                <p14:modId xmlns:p14="http://schemas.microsoft.com/office/powerpoint/2010/main" val="736673978"/>
+              </p:ext>
+            </p:extLst>
+          </p:nvPr>
+        </p:nvGraphicFramePr>
+        <p:xfrm>
+          <a:off x="18112011" y="18843094"/>
+          <a:ext cx="13362502" cy="4568264"/>
+        </p:xfrm>
+        <a:graphic>
+          <a:graphicData uri="http://schemas.openxmlformats.org/drawingml/2006/table">
+            <a:tbl>
+              <a:tblPr firstRow="1" bandRow="1">
+                <a:tableStyleId>{5C22544A-7EE6-4342-B048-85BDC9FD1C3A}</a:tableStyleId>
+              </a:tblPr>
+              <a:tblGrid>
+                <a:gridCol w="6681251">
+                  <a:extLst>
+                    <a:ext uri="{9D8B030D-6E8A-4147-A177-3AD203B41FA5}">
+                      <a16:colId xmlns:a16="http://schemas.microsoft.com/office/drawing/2014/main" val="1643344713"/>
+                    </a:ext>
+                  </a:extLst>
+                </a:gridCol>
+                <a:gridCol w="6681251">
+                  <a:extLst>
+                    <a:ext uri="{9D8B030D-6E8A-4147-A177-3AD203B41FA5}">
+                      <a16:colId xmlns:a16="http://schemas.microsoft.com/office/drawing/2014/main" val="2838925563"/>
+                    </a:ext>
+                  </a:extLst>
+                </a:gridCol>
+              </a:tblGrid>
+              <a:tr h="1306904">
+                <a:tc gridSpan="2">
+                  <a:txBody>
+                    <a:bodyPr/>
+                    <a:lstStyle/>
+                    <a:p>
+                      <a:pPr algn="ctr"/>
+                      <a:r>
+                        <a:rPr lang="fr-FR" sz="3800" noProof="0" dirty="0">
+                          <a:solidFill>
+                            <a:srgbClr val="6C5098"/>
+                          </a:solidFill>
+                        </a:rPr>
+                        <a:t>Bloc Filtreur</a:t>
+                      </a:r>
+                    </a:p>
+                    <a:p>
+                      <a:pPr algn="ctr"/>
+                      <a:r>
+                        <a:rPr lang="fr-FR" sz="3800" b="0" dirty="0">
+                          <a:solidFill>
+                            <a:schemeClr val="tx1"/>
+                          </a:solidFill>
+                        </a:rPr>
+                        <a:t>extrait les caractéristiques des images.</a:t>
+                      </a:r>
+                    </a:p>
+                  </a:txBody>
+                  <a:tcPr>
+                    <a:lnL w="12700" cmpd="sng">
+                      <a:noFill/>
+                    </a:lnL>
+                    <a:lnR w="12700" cmpd="sng">
+                      <a:noFill/>
+                    </a:lnR>
+                    <a:lnT w="12700" cmpd="sng">
+                      <a:noFill/>
+                    </a:lnT>
+                    <a:lnB w="38100" cmpd="sng">
+                      <a:noFill/>
+                    </a:lnB>
+                    <a:lnTlToBr w="12700" cmpd="sng">
+                      <a:noFill/>
+                      <a:prstDash val="solid"/>
+                    </a:lnTlToBr>
+                    <a:lnBlToTr w="12700" cmpd="sng">
+                      <a:noFill/>
+                      <a:prstDash val="solid"/>
+                    </a:lnBlToTr>
+                    <a:noFill/>
+                  </a:tcPr>
+                </a:tc>
+                <a:tc hMerge="1">
+                  <a:txBody>
+                    <a:bodyPr/>
+                    <a:lstStyle/>
+                    <a:p>
+                      <a:endParaRPr lang="en-GB" dirty="0"/>
+                    </a:p>
+                  </a:txBody>
+                  <a:tcPr/>
+                </a:tc>
+                <a:extLst>
+                  <a:ext uri="{0D108BD9-81ED-4DB2-BD59-A6C34878D82A}">
+                    <a16:rowId xmlns:a16="http://schemas.microsoft.com/office/drawing/2014/main" val="1993528755"/>
+                  </a:ext>
+                </a:extLst>
+              </a:tr>
+              <a:tr h="3147864">
+                <a:tc>
+                  <a:txBody>
+                    <a:bodyPr/>
+                    <a:lstStyle/>
+                    <a:p>
+                      <a:pPr marL="0" marR="0" lvl="0" indent="0" algn="ctr" defTabSz="914400" rtl="0" eaLnBrk="0" fontAlgn="base" latinLnBrk="0" hangingPunct="0">
+                        <a:lnSpc>
+                          <a:spcPct val="100000"/>
+                        </a:lnSpc>
+                        <a:spcBef>
+                          <a:spcPct val="0"/>
+                        </a:spcBef>
+                        <a:spcAft>
+                          <a:spcPct val="0"/>
+                        </a:spcAft>
+                        <a:buClrTx/>
+                        <a:buSzTx/>
+                        <a:buFontTx/>
+                        <a:buNone/>
+                        <a:tabLst/>
+                        <a:defRPr/>
+                      </a:pPr>
+                      <a:r>
+                        <a:rPr kumimoji="0" lang="fr-FR" sz="3800" b="1" i="0" u="none" strike="noStrike" kern="1200" cap="none" spc="0" normalizeH="0" baseline="0" noProof="0" dirty="0">
+                          <a:ln>
+                            <a:noFill/>
+                          </a:ln>
+                          <a:solidFill>
+                            <a:srgbClr val="6C5098"/>
+                          </a:solidFill>
+                          <a:effectLst/>
+                          <a:uLnTx/>
+                          <a:uFillTx/>
+                          <a:latin typeface="Arial" charset="0"/>
+                          <a:ea typeface="ＭＳ Ｐゴシック" pitchFamily="34" charset="-128"/>
+                          <a:cs typeface="+mn-cs"/>
+                        </a:rPr>
+                        <a:t>La couche de convolution</a:t>
+                      </a:r>
+                      <a:r>
+                        <a:rPr kumimoji="0" lang="fr-FR" sz="3800" b="1" i="0" u="none" strike="noStrike" kern="1200" cap="none" spc="0" normalizeH="0" baseline="0" noProof="0" dirty="0">
+                          <a:ln>
+                            <a:noFill/>
+                          </a:ln>
+                          <a:solidFill>
+                            <a:srgbClr val="000000"/>
+                          </a:solidFill>
+                          <a:effectLst/>
+                          <a:uLnTx/>
+                          <a:uFillTx/>
+                          <a:latin typeface="Arial" charset="0"/>
+                          <a:ea typeface="ＭＳ Ｐゴシック" pitchFamily="34" charset="-128"/>
+                          <a:cs typeface="+mn-cs"/>
+                        </a:rPr>
+                        <a:t> </a:t>
+                      </a:r>
+                    </a:p>
+                    <a:p>
+                      <a:pPr marL="0" marR="0" lvl="0" indent="0" algn="ctr" defTabSz="914400" rtl="0" eaLnBrk="0" fontAlgn="base" latinLnBrk="0" hangingPunct="0">
+                        <a:lnSpc>
+                          <a:spcPct val="100000"/>
+                        </a:lnSpc>
+                        <a:spcBef>
+                          <a:spcPct val="0"/>
+                        </a:spcBef>
+                        <a:spcAft>
+                          <a:spcPct val="0"/>
+                        </a:spcAft>
+                        <a:buClrTx/>
+                        <a:buSzTx/>
+                        <a:buFontTx/>
+                        <a:buNone/>
+                        <a:tabLst/>
+                        <a:defRPr/>
+                      </a:pPr>
+                      <a:r>
+                        <a:rPr kumimoji="0" lang="fr-FR" sz="3800" b="0" i="0" u="none" strike="noStrike" kern="1200" cap="none" spc="0" normalizeH="0" baseline="0" noProof="0" dirty="0">
+                          <a:ln>
+                            <a:noFill/>
+                          </a:ln>
+                          <a:solidFill>
+                            <a:srgbClr val="000000"/>
+                          </a:solidFill>
+                          <a:effectLst/>
+                          <a:uLnTx/>
+                          <a:uFillTx/>
+                          <a:latin typeface="Arial" charset="0"/>
+                          <a:ea typeface="ＭＳ Ｐゴシック" pitchFamily="34" charset="-128"/>
+                          <a:cs typeface="+mn-cs"/>
+                        </a:rPr>
+                        <a:t>détecte la présence d'un ensemble de caractéristiques dans les images données en entrée.</a:t>
+                      </a:r>
+                    </a:p>
+                    <a:p>
+                      <a:endParaRPr lang="en-GB" dirty="0"/>
+                    </a:p>
+                  </a:txBody>
+                  <a:tcPr>
+                    <a:lnL w="12700" cmpd="sng">
+                      <a:noFill/>
+                    </a:lnL>
+                    <a:lnR w="12700" cmpd="sng">
+                      <a:noFill/>
+                    </a:lnR>
+                    <a:lnT w="38100" cmpd="sng">
+                      <a:noFill/>
+                    </a:lnT>
+                    <a:lnB w="12700" cmpd="sng">
+                      <a:noFill/>
+                    </a:lnB>
+                    <a:lnTlToBr w="12700" cmpd="sng">
+                      <a:noFill/>
+                      <a:prstDash val="solid"/>
+                    </a:lnTlToBr>
+                    <a:lnBlToTr w="12700" cmpd="sng">
+                      <a:noFill/>
+                      <a:prstDash val="solid"/>
+                    </a:lnBlToTr>
+                    <a:noFill/>
+                  </a:tcPr>
+                </a:tc>
+                <a:tc>
+                  <a:txBody>
+                    <a:bodyPr/>
+                    <a:lstStyle/>
+                    <a:p>
+                      <a:pPr marL="0" marR="0" lvl="0" indent="0" algn="ctr" defTabSz="914400" rtl="0" eaLnBrk="0" fontAlgn="base" latinLnBrk="0" hangingPunct="0">
+                        <a:lnSpc>
+                          <a:spcPct val="100000"/>
+                        </a:lnSpc>
+                        <a:spcBef>
+                          <a:spcPct val="0"/>
+                        </a:spcBef>
+                        <a:spcAft>
+                          <a:spcPct val="0"/>
+                        </a:spcAft>
+                        <a:buClrTx/>
+                        <a:buSzTx/>
+                        <a:buFontTx/>
+                        <a:buNone/>
+                        <a:tabLst/>
+                        <a:defRPr/>
+                      </a:pPr>
+                      <a:r>
+                        <a:rPr kumimoji="0" lang="fr-FR" sz="3800" b="1" i="0" u="none" strike="noStrike" kern="1200" cap="none" spc="0" normalizeH="0" baseline="0" noProof="0" dirty="0">
+                          <a:ln>
+                            <a:noFill/>
+                          </a:ln>
+                          <a:solidFill>
+                            <a:srgbClr val="6C5098"/>
+                          </a:solidFill>
+                          <a:effectLst/>
+                          <a:uLnTx/>
+                          <a:uFillTx/>
+                          <a:latin typeface="Arial" charset="0"/>
+                          <a:ea typeface="ＭＳ Ｐゴシック" pitchFamily="34" charset="-128"/>
+                          <a:cs typeface="+mn-cs"/>
+                        </a:rPr>
+                        <a:t>La couche de </a:t>
+                      </a:r>
+                      <a:r>
+                        <a:rPr kumimoji="0" lang="en-US" sz="3800" b="1" i="0" u="none" strike="noStrike" kern="1200" cap="none" spc="0" normalizeH="0" baseline="0" noProof="0" dirty="0">
+                          <a:ln>
+                            <a:noFill/>
+                          </a:ln>
+                          <a:solidFill>
+                            <a:srgbClr val="6C5098"/>
+                          </a:solidFill>
+                          <a:effectLst/>
+                          <a:uLnTx/>
+                          <a:uFillTx/>
+                          <a:latin typeface="Arial" charset="0"/>
+                          <a:ea typeface="ＭＳ Ｐゴシック" pitchFamily="34" charset="-128"/>
+                          <a:cs typeface="+mn-cs"/>
+                        </a:rPr>
+                        <a:t>pooling</a:t>
+                      </a:r>
+                      <a:endParaRPr kumimoji="0" lang="en-US" sz="3800" b="1" i="0" u="none" strike="noStrike" kern="1200" cap="none" spc="0" normalizeH="0" baseline="0" noProof="0" dirty="0">
+                        <a:ln>
+                          <a:noFill/>
+                        </a:ln>
+                        <a:solidFill>
+                          <a:srgbClr val="000000"/>
+                        </a:solidFill>
+                        <a:effectLst/>
+                        <a:uLnTx/>
+                        <a:uFillTx/>
+                        <a:latin typeface="Arial" charset="0"/>
+                        <a:ea typeface="ＭＳ Ｐゴシック" pitchFamily="34" charset="-128"/>
+                        <a:cs typeface="+mn-cs"/>
+                      </a:endParaRPr>
+                    </a:p>
+                    <a:p>
+                      <a:pPr marL="0" marR="0" lvl="0" indent="0" algn="ctr" defTabSz="914400" rtl="0" eaLnBrk="0" fontAlgn="base" latinLnBrk="0" hangingPunct="0">
+                        <a:lnSpc>
+                          <a:spcPct val="100000"/>
+                        </a:lnSpc>
+                        <a:spcBef>
+                          <a:spcPct val="0"/>
+                        </a:spcBef>
+                        <a:spcAft>
+                          <a:spcPct val="0"/>
+                        </a:spcAft>
+                        <a:buClrTx/>
+                        <a:buSzTx/>
+                        <a:buFontTx/>
+                        <a:buNone/>
+                        <a:tabLst/>
+                        <a:defRPr/>
+                      </a:pPr>
+                      <a:r>
+                        <a:rPr kumimoji="0" lang="fr-FR" sz="3800" b="0" i="0" u="none" strike="noStrike" kern="1200" cap="none" spc="0" normalizeH="0" baseline="0" noProof="0" dirty="0">
+                          <a:ln>
+                            <a:noFill/>
+                          </a:ln>
+                          <a:solidFill>
+                            <a:srgbClr val="000000"/>
+                          </a:solidFill>
+                          <a:effectLst/>
+                          <a:uLnTx/>
+                          <a:uFillTx/>
+                          <a:latin typeface="Arial" charset="0"/>
+                          <a:ea typeface="ＭＳ Ｐゴシック" pitchFamily="34" charset="-128"/>
+                          <a:cs typeface="+mn-cs"/>
+                        </a:rPr>
+                        <a:t>réduit la taille d'un ensemble de caractéristiques tout en préservant les plus importantes.</a:t>
+                      </a:r>
+                    </a:p>
+                    <a:p>
+                      <a:endParaRPr lang="en-GB" dirty="0"/>
+                    </a:p>
+                  </a:txBody>
+                  <a:tcPr>
+                    <a:lnL w="12700" cmpd="sng">
+                      <a:noFill/>
+                    </a:lnL>
+                    <a:lnR w="12700" cmpd="sng">
+                      <a:noFill/>
+                    </a:lnR>
+                    <a:lnT w="38100" cmpd="sng">
+                      <a:noFill/>
+                    </a:lnT>
+                    <a:lnB w="12700" cmpd="sng">
+                      <a:noFill/>
+                    </a:lnB>
+                    <a:lnTlToBr w="12700" cmpd="sng">
+                      <a:noFill/>
+                      <a:prstDash val="solid"/>
+                    </a:lnTlToBr>
+                    <a:lnBlToTr w="12700" cmpd="sng">
+                      <a:noFill/>
+                      <a:prstDash val="solid"/>
+                    </a:lnBlToTr>
+                    <a:noFill/>
+                  </a:tcPr>
+                </a:tc>
+                <a:extLst>
+                  <a:ext uri="{0D108BD9-81ED-4DB2-BD59-A6C34878D82A}">
+                    <a16:rowId xmlns:a16="http://schemas.microsoft.com/office/drawing/2014/main" val="2872119397"/>
+                  </a:ext>
+                </a:extLst>
+              </a:tr>
+            </a:tbl>
+          </a:graphicData>
+        </a:graphic>
+      </p:graphicFrame>
+      <p:graphicFrame>
+        <p:nvGraphicFramePr>
+          <p:cNvPr id="46" name="Table 18">
+            <a:extLst>
+              <a:ext uri="{FF2B5EF4-FFF2-40B4-BE49-F238E27FC236}">
+                <a16:creationId xmlns:a16="http://schemas.microsoft.com/office/drawing/2014/main" id="{AA2B973D-9A5C-4F9D-93D8-F7CCFDC59497}"/>
+              </a:ext>
+            </a:extLst>
+          </p:cNvPr>
+          <p:cNvGraphicFramePr>
+            <a:graphicFrameLocks noGrp="1"/>
+          </p:cNvGraphicFramePr>
+          <p:nvPr>
+            <p:extLst>
+              <p:ext uri="{D42A27DB-BD31-4B8C-83A1-F6EECF244321}">
+                <p14:modId xmlns:p14="http://schemas.microsoft.com/office/powerpoint/2010/main" val="1447790005"/>
+              </p:ext>
+            </p:extLst>
+          </p:nvPr>
+        </p:nvGraphicFramePr>
+        <p:xfrm>
+          <a:off x="18050451" y="23897064"/>
+          <a:ext cx="13362502" cy="5685150"/>
+        </p:xfrm>
+        <a:graphic>
+          <a:graphicData uri="http://schemas.openxmlformats.org/drawingml/2006/table">
+            <a:tbl>
+              <a:tblPr firstRow="1" bandRow="1">
+                <a:tableStyleId>{5C22544A-7EE6-4342-B048-85BDC9FD1C3A}</a:tableStyleId>
+              </a:tblPr>
+              <a:tblGrid>
+                <a:gridCol w="6681251">
+                  <a:extLst>
+                    <a:ext uri="{9D8B030D-6E8A-4147-A177-3AD203B41FA5}">
+                      <a16:colId xmlns:a16="http://schemas.microsoft.com/office/drawing/2014/main" val="1643344713"/>
+                    </a:ext>
+                  </a:extLst>
+                </a:gridCol>
+                <a:gridCol w="6681251">
+                  <a:extLst>
+                    <a:ext uri="{9D8B030D-6E8A-4147-A177-3AD203B41FA5}">
+                      <a16:colId xmlns:a16="http://schemas.microsoft.com/office/drawing/2014/main" val="2838925563"/>
+                    </a:ext>
+                  </a:extLst>
+                </a:gridCol>
+              </a:tblGrid>
+              <a:tr h="1844670">
+                <a:tc gridSpan="2">
+                  <a:txBody>
+                    <a:bodyPr/>
+                    <a:lstStyle/>
+                    <a:p>
+                      <a:pPr algn="ctr"/>
+                      <a:r>
+                        <a:rPr lang="fr-FR" sz="3800" noProof="0" dirty="0">
+                          <a:solidFill>
+                            <a:srgbClr val="6C5098"/>
+                          </a:solidFill>
+                        </a:rPr>
+                        <a:t>Bloc Classifieur</a:t>
+                      </a:r>
+                    </a:p>
+                    <a:p>
+                      <a:pPr algn="ctr"/>
+                      <a:r>
+                        <a:rPr lang="fr-FR" sz="3800" b="0" dirty="0">
+                          <a:solidFill>
+                            <a:schemeClr val="tx1"/>
+                          </a:solidFill>
+                        </a:rPr>
+                        <a:t>  étant donné les caractéristiques des images,</a:t>
+                      </a:r>
+                    </a:p>
+                    <a:p>
+                      <a:pPr algn="ctr"/>
+                      <a:r>
+                        <a:rPr lang="fr-FR" sz="3800" b="0" dirty="0">
+                          <a:solidFill>
+                            <a:schemeClr val="tx1"/>
+                          </a:solidFill>
+                        </a:rPr>
+                        <a:t>détermine à quelle classe appartient l'image.</a:t>
+                      </a:r>
+                      <a:endParaRPr lang="en-GB" sz="3800" b="0" dirty="0">
+                        <a:solidFill>
+                          <a:schemeClr val="tx1"/>
+                        </a:solidFill>
+                      </a:endParaRPr>
+                    </a:p>
+                  </a:txBody>
+                  <a:tcPr>
+                    <a:lnL w="12700" cmpd="sng">
+                      <a:noFill/>
+                    </a:lnL>
+                    <a:lnR w="12700" cmpd="sng">
+                      <a:noFill/>
+                    </a:lnR>
+                    <a:lnT w="12700" cmpd="sng">
+                      <a:noFill/>
+                    </a:lnT>
+                    <a:lnB w="38100" cmpd="sng">
+                      <a:noFill/>
+                    </a:lnB>
+                    <a:lnTlToBr w="12700" cmpd="sng">
+                      <a:noFill/>
+                      <a:prstDash val="solid"/>
+                    </a:lnTlToBr>
+                    <a:lnBlToTr w="12700" cmpd="sng">
+                      <a:noFill/>
+                      <a:prstDash val="solid"/>
+                    </a:lnBlToTr>
+                    <a:noFill/>
+                  </a:tcPr>
+                </a:tc>
+                <a:tc hMerge="1">
+                  <a:txBody>
+                    <a:bodyPr/>
+                    <a:lstStyle/>
+                    <a:p>
+                      <a:endParaRPr lang="en-GB" dirty="0"/>
+                    </a:p>
+                  </a:txBody>
+                  <a:tcPr/>
+                </a:tc>
+                <a:extLst>
+                  <a:ext uri="{0D108BD9-81ED-4DB2-BD59-A6C34878D82A}">
+                    <a16:rowId xmlns:a16="http://schemas.microsoft.com/office/drawing/2014/main" val="1993528755"/>
+                  </a:ext>
+                </a:extLst>
+              </a:tr>
+              <a:tr h="3469237">
+                <a:tc>
+                  <a:txBody>
+                    <a:bodyPr/>
+                    <a:lstStyle/>
+                    <a:p>
+                      <a:pPr marL="0" marR="0" lvl="0" indent="0" algn="ctr" defTabSz="914400" rtl="0" eaLnBrk="0" fontAlgn="base" latinLnBrk="0" hangingPunct="0">
+                        <a:lnSpc>
+                          <a:spcPct val="100000"/>
+                        </a:lnSpc>
+                        <a:spcBef>
+                          <a:spcPct val="0"/>
+                        </a:spcBef>
+                        <a:spcAft>
+                          <a:spcPct val="0"/>
+                        </a:spcAft>
+                        <a:buClrTx/>
+                        <a:buSzTx/>
+                        <a:buFontTx/>
+                        <a:buNone/>
+                        <a:tabLst/>
+                        <a:defRPr/>
+                      </a:pPr>
+                      <a:r>
+                        <a:rPr kumimoji="0" lang="fr-FR" sz="3800" b="1" i="0" u="none" strike="noStrike" kern="1200" cap="none" spc="0" normalizeH="0" baseline="0" noProof="0" dirty="0">
+                          <a:ln>
+                            <a:noFill/>
+                          </a:ln>
+                          <a:solidFill>
+                            <a:srgbClr val="6C5098"/>
+                          </a:solidFill>
+                          <a:effectLst/>
+                          <a:uLnTx/>
+                          <a:uFillTx/>
+                          <a:latin typeface="Arial" charset="0"/>
+                          <a:ea typeface="ＭＳ Ｐゴシック" pitchFamily="34" charset="-128"/>
+                          <a:cs typeface="+mn-cs"/>
+                        </a:rPr>
+                        <a:t>La couche de correction ReLU</a:t>
+                      </a:r>
+                    </a:p>
+                    <a:p>
+                      <a:pPr marL="0" marR="0" lvl="0" indent="0" algn="ctr" defTabSz="914400" rtl="0" eaLnBrk="0" fontAlgn="base" latinLnBrk="0" hangingPunct="0">
+                        <a:lnSpc>
+                          <a:spcPct val="100000"/>
+                        </a:lnSpc>
+                        <a:spcBef>
+                          <a:spcPct val="0"/>
+                        </a:spcBef>
+                        <a:spcAft>
+                          <a:spcPct val="0"/>
+                        </a:spcAft>
+                        <a:buClrTx/>
+                        <a:buSzTx/>
+                        <a:buFontTx/>
+                        <a:buNone/>
+                        <a:tabLst/>
+                        <a:defRPr/>
+                      </a:pPr>
+                      <a:endParaRPr kumimoji="0" lang="fr-FR" sz="3800" b="0" i="0" u="none" strike="noStrike" kern="1200" cap="none" spc="0" normalizeH="0" baseline="0" noProof="0" dirty="0">
+                        <a:ln>
+                          <a:noFill/>
+                        </a:ln>
+                        <a:solidFill>
+                          <a:srgbClr val="000000"/>
+                        </a:solidFill>
+                        <a:effectLst/>
+                        <a:uLnTx/>
+                        <a:uFillTx/>
+                        <a:latin typeface="Arial" charset="0"/>
+                        <a:ea typeface="ＭＳ Ｐゴシック" pitchFamily="34" charset="-128"/>
+                        <a:cs typeface="+mn-cs"/>
+                      </a:endParaRPr>
+                    </a:p>
+                    <a:p>
+                      <a:pPr marL="0" marR="0" lvl="0" indent="0" algn="ctr" defTabSz="914400" rtl="0" eaLnBrk="0" fontAlgn="base" latinLnBrk="0" hangingPunct="0">
+                        <a:lnSpc>
+                          <a:spcPct val="100000"/>
+                        </a:lnSpc>
+                        <a:spcBef>
+                          <a:spcPct val="0"/>
+                        </a:spcBef>
+                        <a:spcAft>
+                          <a:spcPct val="0"/>
+                        </a:spcAft>
+                        <a:buClrTx/>
+                        <a:buSzTx/>
+                        <a:buFontTx/>
+                        <a:buNone/>
+                        <a:tabLst/>
+                        <a:defRPr/>
+                      </a:pPr>
+                      <a:r>
+                        <a:rPr kumimoji="0" lang="fr-FR" sz="3800" b="0" i="0" u="none" strike="noStrike" kern="1200" cap="none" spc="0" normalizeH="0" baseline="0" noProof="0" dirty="0">
+                          <a:ln>
+                            <a:noFill/>
+                          </a:ln>
+                          <a:solidFill>
+                            <a:srgbClr val="000000"/>
+                          </a:solidFill>
+                          <a:effectLst/>
+                          <a:uLnTx/>
+                          <a:uFillTx/>
+                          <a:latin typeface="Arial" charset="0"/>
+                          <a:ea typeface="ＭＳ Ｐゴシック" pitchFamily="34" charset="-128"/>
+                          <a:cs typeface="+mn-cs"/>
+                        </a:rPr>
+                        <a:t>est une fonction d’activation, remplace les valeurs négatives par des zéros.</a:t>
+                      </a:r>
+                      <a:endParaRPr kumimoji="0" lang="fr-FR" sz="3800" b="1" i="0" u="none" strike="noStrike" kern="1200" cap="none" spc="0" normalizeH="0" baseline="0" noProof="0" dirty="0">
+                        <a:ln>
+                          <a:noFill/>
+                        </a:ln>
+                        <a:solidFill>
+                          <a:srgbClr val="000000"/>
+                        </a:solidFill>
+                        <a:effectLst/>
+                        <a:uLnTx/>
+                        <a:uFillTx/>
+                        <a:latin typeface="Arial" charset="0"/>
+                        <a:ea typeface="ＭＳ Ｐゴシック" pitchFamily="34" charset="-128"/>
+                        <a:cs typeface="+mn-cs"/>
+                      </a:endParaRPr>
+                    </a:p>
+                    <a:p>
+                      <a:endParaRPr lang="en-GB" dirty="0"/>
+                    </a:p>
+                  </a:txBody>
+                  <a:tcPr>
+                    <a:lnL w="12700" cmpd="sng">
+                      <a:noFill/>
+                    </a:lnL>
+                    <a:lnR w="12700" cmpd="sng">
+                      <a:noFill/>
+                    </a:lnR>
+                    <a:lnT w="38100" cmpd="sng">
+                      <a:noFill/>
+                    </a:lnT>
+                    <a:lnB w="12700" cmpd="sng">
+                      <a:noFill/>
+                    </a:lnB>
+                    <a:lnTlToBr w="12700" cmpd="sng">
+                      <a:noFill/>
+                      <a:prstDash val="solid"/>
+                    </a:lnTlToBr>
+                    <a:lnBlToTr w="12700" cmpd="sng">
+                      <a:noFill/>
+                      <a:prstDash val="solid"/>
+                    </a:lnBlToTr>
+                    <a:noFill/>
+                  </a:tcPr>
+                </a:tc>
+                <a:tc>
+                  <a:txBody>
+                    <a:bodyPr/>
+                    <a:lstStyle/>
+                    <a:p>
+                      <a:pPr marL="0" marR="0" lvl="0" indent="0" algn="ctr" defTabSz="914400" rtl="0" eaLnBrk="0" fontAlgn="base" latinLnBrk="0" hangingPunct="0">
+                        <a:lnSpc>
+                          <a:spcPct val="100000"/>
+                        </a:lnSpc>
+                        <a:spcBef>
+                          <a:spcPct val="0"/>
+                        </a:spcBef>
+                        <a:spcAft>
+                          <a:spcPct val="0"/>
+                        </a:spcAft>
+                        <a:buClrTx/>
+                        <a:buSzTx/>
+                        <a:buFontTx/>
+                        <a:buNone/>
+                        <a:tabLst/>
+                        <a:defRPr/>
+                      </a:pPr>
+                      <a:r>
+                        <a:rPr kumimoji="0" lang="fr-FR" sz="3800" b="1" i="0" u="none" strike="noStrike" kern="1200" cap="none" spc="0" normalizeH="0" baseline="0" noProof="0" dirty="0">
+                          <a:ln>
+                            <a:noFill/>
+                          </a:ln>
+                          <a:solidFill>
+                            <a:srgbClr val="6C5098"/>
+                          </a:solidFill>
+                          <a:effectLst/>
+                          <a:uLnTx/>
+                          <a:uFillTx/>
+                          <a:latin typeface="Arial" charset="0"/>
+                          <a:ea typeface="ＭＳ Ｐゴシック" pitchFamily="34" charset="-128"/>
+                          <a:cs typeface="+mn-cs"/>
+                        </a:rPr>
+                        <a:t>La couche fully-connected</a:t>
+                      </a:r>
+                    </a:p>
+                    <a:p>
+                      <a:pPr marL="0" marR="0" lvl="0" indent="0" algn="ctr" defTabSz="914400" rtl="0" eaLnBrk="0" fontAlgn="base" latinLnBrk="0" hangingPunct="0">
+                        <a:lnSpc>
+                          <a:spcPct val="100000"/>
+                        </a:lnSpc>
+                        <a:spcBef>
+                          <a:spcPct val="0"/>
+                        </a:spcBef>
+                        <a:spcAft>
+                          <a:spcPct val="0"/>
+                        </a:spcAft>
+                        <a:buClrTx/>
+                        <a:buSzTx/>
+                        <a:buFontTx/>
+                        <a:buNone/>
+                        <a:tabLst/>
+                        <a:defRPr/>
+                      </a:pPr>
+                      <a:endParaRPr kumimoji="0" lang="fr-FR" sz="3800" b="0" i="0" u="none" strike="noStrike" kern="1200" cap="none" spc="0" normalizeH="0" baseline="0" noProof="0" dirty="0">
+                        <a:ln>
+                          <a:noFill/>
+                        </a:ln>
+                        <a:solidFill>
+                          <a:srgbClr val="000000"/>
+                        </a:solidFill>
+                        <a:effectLst/>
+                        <a:uLnTx/>
+                        <a:uFillTx/>
+                        <a:latin typeface="Arial" charset="0"/>
+                        <a:ea typeface="ＭＳ Ｐゴシック" pitchFamily="34" charset="-128"/>
+                        <a:cs typeface="+mn-cs"/>
+                      </a:endParaRPr>
+                    </a:p>
+                    <a:p>
+                      <a:pPr marL="0" marR="0" lvl="0" indent="0" algn="ctr" defTabSz="914400" rtl="0" eaLnBrk="0" fontAlgn="base" latinLnBrk="0" hangingPunct="0">
+                        <a:lnSpc>
+                          <a:spcPct val="100000"/>
+                        </a:lnSpc>
+                        <a:spcBef>
+                          <a:spcPct val="0"/>
+                        </a:spcBef>
+                        <a:spcAft>
+                          <a:spcPct val="0"/>
+                        </a:spcAft>
+                        <a:buClrTx/>
+                        <a:buSzTx/>
+                        <a:buFontTx/>
+                        <a:buNone/>
+                        <a:tabLst/>
+                        <a:defRPr/>
+                      </a:pPr>
+                      <a:r>
+                        <a:rPr kumimoji="0" lang="fr-FR" sz="3800" b="0" i="0" u="none" strike="noStrike" kern="1200" cap="none" spc="0" normalizeH="0" baseline="0" noProof="0" dirty="0">
+                          <a:ln>
+                            <a:noFill/>
+                          </a:ln>
+                          <a:solidFill>
+                            <a:srgbClr val="000000"/>
+                          </a:solidFill>
+                          <a:effectLst/>
+                          <a:uLnTx/>
+                          <a:uFillTx/>
+                          <a:latin typeface="Arial" charset="0"/>
+                          <a:ea typeface="ＭＳ Ｐゴシック" pitchFamily="34" charset="-128"/>
+                          <a:cs typeface="+mn-cs"/>
+                        </a:rPr>
+                        <a:t>transforme un vecteur en un autre en appliquant une combinaison linéaire avec ou sans fonction d’activation.</a:t>
+                      </a:r>
+                      <a:endParaRPr kumimoji="0" lang="fr-FR" sz="3800" b="1" i="0" u="none" strike="noStrike" kern="1200" cap="none" spc="0" normalizeH="0" baseline="0" noProof="0" dirty="0">
+                        <a:ln>
+                          <a:noFill/>
+                        </a:ln>
+                        <a:solidFill>
+                          <a:srgbClr val="000000"/>
+                        </a:solidFill>
+                        <a:effectLst/>
+                        <a:uLnTx/>
+                        <a:uFillTx/>
+                        <a:latin typeface="Arial" charset="0"/>
+                        <a:ea typeface="ＭＳ Ｐゴシック" pitchFamily="34" charset="-128"/>
+                        <a:cs typeface="+mn-cs"/>
+                      </a:endParaRPr>
+                    </a:p>
+                    <a:p>
+                      <a:endParaRPr lang="en-GB" dirty="0"/>
+                    </a:p>
+                  </a:txBody>
+                  <a:tcPr>
+                    <a:lnL w="12700" cmpd="sng">
+                      <a:noFill/>
+                    </a:lnL>
+                    <a:lnR w="12700" cmpd="sng">
+                      <a:noFill/>
+                    </a:lnR>
+                    <a:lnT w="38100" cmpd="sng">
+                      <a:noFill/>
+                    </a:lnT>
+                    <a:lnB w="12700" cmpd="sng">
+                      <a:noFill/>
+                    </a:lnB>
+                    <a:lnTlToBr w="12700" cmpd="sng">
+                      <a:noFill/>
+                      <a:prstDash val="solid"/>
+                    </a:lnTlToBr>
+                    <a:lnBlToTr w="12700" cmpd="sng">
+                      <a:noFill/>
+                      <a:prstDash val="solid"/>
+                    </a:lnBlToTr>
+                    <a:noFill/>
+                  </a:tcPr>
+                </a:tc>
+                <a:extLst>
+                  <a:ext uri="{0D108BD9-81ED-4DB2-BD59-A6C34878D82A}">
+                    <a16:rowId xmlns:a16="http://schemas.microsoft.com/office/drawing/2014/main" val="2872119397"/>
+                  </a:ext>
+                </a:extLst>
+              </a:tr>
+            </a:tbl>
+          </a:graphicData>
+        </a:graphic>
+      </p:graphicFrame>
       <p:pic>
         <p:nvPicPr>
-          <p:cNvPr id="83" name="Picture 2">
+          <p:cNvPr id="8" name="Picture 7" descr="A screenshot of a cell phone&#10;&#10;Description automatically generated">
             <a:extLst>
               <a:ext uri="{FF2B5EF4-FFF2-40B4-BE49-F238E27FC236}">
-                <a16:creationId xmlns:a16="http://schemas.microsoft.com/office/drawing/2014/main" id="{F715BA96-317E-43E2-B0D9-7D61684619E5}"/>
+                <a16:creationId xmlns:a16="http://schemas.microsoft.com/office/drawing/2014/main" id="{A14AD4C3-93BF-432E-9860-A92EFC207D59}"/>
               </a:ext>
             </a:extLst>
           </p:cNvPr>
           <p:cNvPicPr>
-            <a:picLocks noChangeAspect="1" noChangeArrowheads="1"/>
+            <a:picLocks noChangeAspect="1"/>
           </p:cNvPicPr>
           <p:nvPr/>
         </p:nvPicPr>
@@ -8839,238 +9261,64 @@
               </a:ext>
             </a:extLst>
           </a:blip>
-          <a:srcRect/>
           <a:stretch>
             <a:fillRect/>
           </a:stretch>
         </p:blipFill>
-        <p:spPr bwMode="auto">
+        <p:spPr>
           <a:xfrm>
-            <a:off x="3248999" y="25165670"/>
-            <a:ext cx="6490497" cy="2994985"/>
+            <a:off x="19824089" y="30307232"/>
+            <a:ext cx="9815225" cy="6811766"/>
+          </a:xfrm>
+          <a:prstGeom prst="rect">
+            <a:avLst/>
+          </a:prstGeom>
+        </p:spPr>
+      </p:pic>
+      <p:sp>
+        <p:nvSpPr>
+          <p:cNvPr id="45" name="TextBox 44">
+            <a:extLst>
+              <a:ext uri="{FF2B5EF4-FFF2-40B4-BE49-F238E27FC236}">
+                <a16:creationId xmlns:a16="http://schemas.microsoft.com/office/drawing/2014/main" id="{9EB1432B-3134-4FD4-97BE-54F5280D87B4}"/>
+              </a:ext>
+            </a:extLst>
+          </p:cNvPr>
+          <p:cNvSpPr txBox="1"/>
+          <p:nvPr/>
+        </p:nvSpPr>
+        <p:spPr>
+          <a:xfrm>
+            <a:off x="18527093" y="36686950"/>
+            <a:ext cx="12885860" cy="3600986"/>
           </a:xfrm>
           <a:prstGeom prst="rect">
             <a:avLst/>
           </a:prstGeom>
           <a:noFill/>
-          <a:extLst>
-            <a:ext uri="{909E8E84-426E-40DD-AFC4-6F175D3DCCD1}">
-              <a14:hiddenFill xmlns:a14="http://schemas.microsoft.com/office/drawing/2010/main">
-                <a:solidFill>
-                  <a:srgbClr val="FFFFFF"/>
-                </a:solidFill>
-              </a14:hiddenFill>
-            </a:ext>
-          </a:extLst>
-        </p:spPr>
-      </p:pic>
-      <p:sp>
-        <p:nvSpPr>
-          <p:cNvPr id="81" name="Rectangle: Rounded Corners 80">
-            <a:extLst>
-              <a:ext uri="{FF2B5EF4-FFF2-40B4-BE49-F238E27FC236}">
-                <a16:creationId xmlns:a16="http://schemas.microsoft.com/office/drawing/2014/main" id="{EDBAF128-24EF-4522-AF5E-1A10635E21C2}"/>
-              </a:ext>
-            </a:extLst>
-          </p:cNvPr>
-          <p:cNvSpPr/>
-          <p:nvPr/>
-        </p:nvSpPr>
-        <p:spPr bwMode="auto">
-          <a:xfrm>
-            <a:off x="2665540" y="24899698"/>
-            <a:ext cx="13307902" cy="6306518"/>
-          </a:xfrm>
-          <a:prstGeom prst="roundRect">
-            <a:avLst/>
-          </a:prstGeom>
-          <a:noFill/>
-          <a:ln w="9525" cap="flat" cmpd="sng" algn="ctr">
-            <a:solidFill>
-              <a:srgbClr val="6C5098"/>
-            </a:solidFill>
-            <a:prstDash val="solid"/>
-            <a:round/>
-            <a:headEnd type="none" w="med" len="med"/>
-            <a:tailEnd type="none" w="med" len="med"/>
-          </a:ln>
-          <a:effectLst/>
         </p:spPr>
         <p:txBody>
-          <a:bodyPr vert="horz" wrap="square" lIns="91440" tIns="45720" rIns="91440" bIns="45720" numCol="1" rtlCol="0" anchor="t" anchorCtr="0" compatLnSpc="1">
-            <a:prstTxWarp prst="textNoShape">
-              <a:avLst/>
-            </a:prstTxWarp>
+          <a:bodyPr wrap="square" rtlCol="0">
+            <a:spAutoFit/>
           </a:bodyPr>
           <a:lstStyle/>
           <a:p>
-            <a:pPr marL="0" marR="0" indent="0" algn="l" defTabSz="914400" rtl="0" eaLnBrk="0" fontAlgn="base" latinLnBrk="0" hangingPunct="0">
-              <a:lnSpc>
-                <a:spcPct val="100000"/>
-              </a:lnSpc>
-              <a:spcBef>
-                <a:spcPct val="0"/>
-              </a:spcBef>
-              <a:spcAft>
-                <a:spcPct val="0"/>
-              </a:spcAft>
-              <a:buClrTx/>
-              <a:buSzTx/>
-              <a:buFontTx/>
-              <a:buNone/>
-              <a:tabLst/>
-            </a:pPr>
-            <a:endParaRPr kumimoji="0" lang="en-GB" sz="2400" b="0" i="0" u="none" strike="noStrike" cap="none" normalizeH="0" baseline="0" dirty="0">
-              <a:ln>
-                <a:noFill/>
-              </a:ln>
-              <a:solidFill>
-                <a:schemeClr val="tx1"/>
-              </a:solidFill>
-              <a:effectLst/>
-              <a:latin typeface="Arial" charset="0"/>
-              <a:ea typeface="ＭＳ Ｐゴシック" pitchFamily="1" charset="-128"/>
-            </a:endParaRPr>
-          </a:p>
-        </p:txBody>
-      </p:sp>
-      <p:sp>
-        <p:nvSpPr>
-          <p:cNvPr id="85" name="Rectangle: Rounded Corners 84">
-            <a:extLst>
-              <a:ext uri="{FF2B5EF4-FFF2-40B4-BE49-F238E27FC236}">
-                <a16:creationId xmlns:a16="http://schemas.microsoft.com/office/drawing/2014/main" id="{CB9920A1-AB77-41DC-BDEB-353470F1B378}"/>
-              </a:ext>
-            </a:extLst>
-          </p:cNvPr>
-          <p:cNvSpPr/>
-          <p:nvPr/>
-        </p:nvSpPr>
-        <p:spPr bwMode="auto">
-          <a:xfrm>
-            <a:off x="2665541" y="31386489"/>
-            <a:ext cx="13307902" cy="6308573"/>
-          </a:xfrm>
-          <a:prstGeom prst="roundRect">
-            <a:avLst/>
-          </a:prstGeom>
-          <a:noFill/>
-          <a:ln w="9525" cap="flat" cmpd="sng" algn="ctr">
-            <a:solidFill>
-              <a:srgbClr val="6C5098"/>
-            </a:solidFill>
-            <a:prstDash val="solid"/>
-            <a:round/>
-            <a:headEnd type="none" w="med" len="med"/>
-            <a:tailEnd type="none" w="med" len="med"/>
-          </a:ln>
-          <a:effectLst/>
-        </p:spPr>
-        <p:txBody>
-          <a:bodyPr vert="horz" wrap="square" lIns="91440" tIns="45720" rIns="91440" bIns="45720" numCol="1" rtlCol="0" anchor="t" anchorCtr="0" compatLnSpc="1">
-            <a:prstTxWarp prst="textNoShape">
-              <a:avLst/>
-            </a:prstTxWarp>
-          </a:bodyPr>
-          <a:lstStyle/>
-          <a:p>
-            <a:pPr marL="0" marR="0" indent="0" algn="l" defTabSz="914400" rtl="0" eaLnBrk="0" fontAlgn="base" latinLnBrk="0" hangingPunct="0">
-              <a:lnSpc>
-                <a:spcPct val="100000"/>
-              </a:lnSpc>
-              <a:spcBef>
-                <a:spcPct val="0"/>
-              </a:spcBef>
-              <a:spcAft>
-                <a:spcPct val="0"/>
-              </a:spcAft>
-              <a:buClrTx/>
-              <a:buSzTx/>
-              <a:buFontTx/>
-              <a:buNone/>
-              <a:tabLst/>
-            </a:pPr>
-            <a:endParaRPr kumimoji="0" lang="en-GB" sz="2400" b="0" i="0" u="none" strike="noStrike" cap="none" normalizeH="0" baseline="0" dirty="0">
-              <a:ln>
-                <a:noFill/>
-              </a:ln>
-              <a:solidFill>
-                <a:schemeClr val="tx1"/>
-              </a:solidFill>
-              <a:effectLst/>
-              <a:latin typeface="Arial" charset="0"/>
-              <a:ea typeface="ＭＳ Ｐゴシック" pitchFamily="1" charset="-128"/>
-            </a:endParaRPr>
-          </a:p>
-        </p:txBody>
-      </p:sp>
-      <p:sp>
-        <p:nvSpPr>
-          <p:cNvPr id="86" name="Rectangle: Rounded Corners 85">
-            <a:extLst>
-              <a:ext uri="{FF2B5EF4-FFF2-40B4-BE49-F238E27FC236}">
-                <a16:creationId xmlns:a16="http://schemas.microsoft.com/office/drawing/2014/main" id="{DDEB4AE3-A6D2-4998-AD89-CE08D3DF690E}"/>
-              </a:ext>
-            </a:extLst>
-          </p:cNvPr>
-          <p:cNvSpPr/>
-          <p:nvPr/>
-        </p:nvSpPr>
-        <p:spPr bwMode="auto">
-          <a:xfrm>
-            <a:off x="18214833" y="30228417"/>
-            <a:ext cx="13307903" cy="10116308"/>
-          </a:xfrm>
-          <a:prstGeom prst="roundRect">
-            <a:avLst/>
-          </a:prstGeom>
-          <a:noFill/>
-          <a:ln w="9525" cap="flat" cmpd="sng" algn="ctr">
-            <a:solidFill>
-              <a:srgbClr val="6C5098"/>
-            </a:solidFill>
-            <a:prstDash val="solid"/>
-            <a:round/>
-            <a:headEnd type="none" w="med" len="med"/>
-            <a:tailEnd type="none" w="med" len="med"/>
-          </a:ln>
-          <a:effectLst/>
-        </p:spPr>
-        <p:txBody>
-          <a:bodyPr vert="horz" wrap="square" lIns="91440" tIns="45720" rIns="91440" bIns="45720" numCol="1" rtlCol="0" anchor="t" anchorCtr="0" compatLnSpc="1">
-            <a:prstTxWarp prst="textNoShape">
-              <a:avLst/>
-            </a:prstTxWarp>
-          </a:bodyPr>
-          <a:lstStyle/>
-          <a:p>
-            <a:pPr marL="0" marR="0" indent="0" algn="l" defTabSz="914400" rtl="0" eaLnBrk="0" fontAlgn="base" latinLnBrk="0" hangingPunct="0">
-              <a:lnSpc>
-                <a:spcPct val="100000"/>
-              </a:lnSpc>
-              <a:spcBef>
-                <a:spcPct val="0"/>
-              </a:spcBef>
-              <a:spcAft>
-                <a:spcPct val="0"/>
-              </a:spcAft>
-              <a:buClrTx/>
-              <a:buSzTx/>
-              <a:buFontTx/>
-              <a:buNone/>
-              <a:tabLst/>
-            </a:pPr>
-            <a:endParaRPr kumimoji="0" lang="en-GB" sz="2400" b="0" i="0" u="none" strike="noStrike" cap="none" normalizeH="0" baseline="0" dirty="0">
-              <a:ln>
-                <a:noFill/>
-              </a:ln>
-              <a:solidFill>
-                <a:schemeClr val="tx1"/>
-              </a:solidFill>
-              <a:effectLst/>
-              <a:latin typeface="Arial" charset="0"/>
-              <a:ea typeface="ＭＳ Ｐゴシック" pitchFamily="1" charset="-128"/>
-            </a:endParaRPr>
+            <a:pPr algn="ctr"/>
+            <a:r>
+              <a:rPr lang="en-US" sz="3800" b="1" dirty="0">
+                <a:solidFill>
+                  <a:srgbClr val="6C5098"/>
+                </a:solidFill>
+              </a:rPr>
+              <a:t>Transfer learning</a:t>
+            </a:r>
+          </a:p>
+          <a:p>
+            <a:pPr algn="ctr"/>
+            <a:r>
+              <a:rPr lang="fr-FR" sz="3800" dirty="0"/>
+              <a:t>consiste à utiliser un modèle pré-entraîné pour un problème de classification et de l’adapter à un nouveau problème. Pour ce faire il faut prendre le modèle pré-entraîné en réentraînant ses dernières couches fully-connected sur le nouveau jeu de données.</a:t>
+            </a:r>
           </a:p>
         </p:txBody>
       </p:sp>

</xml_diff>